<commit_message>
Added redux thunk to the course
</commit_message>
<xml_diff>
--- a/lesson-react-50-redux-async/react-redux-async.pptx
+++ b/lesson-react-50-redux-async/react-redux-async.pptx
@@ -5,27 +5,30 @@
     <p:sldMasterId id="2147483674" r:id="rId1"/>
   </p:sldMasterIdLst>
   <p:notesMasterIdLst>
-    <p:notesMasterId r:id="rId12"/>
+    <p:notesMasterId r:id="rId15"/>
   </p:notesMasterIdLst>
   <p:handoutMasterIdLst>
-    <p:handoutMasterId r:id="rId13"/>
+    <p:handoutMasterId r:id="rId16"/>
   </p:handoutMasterIdLst>
   <p:sldIdLst>
     <p:sldId id="298" r:id="rId2"/>
     <p:sldId id="407" r:id="rId3"/>
     <p:sldId id="397" r:id="rId4"/>
-    <p:sldId id="400" r:id="rId5"/>
-    <p:sldId id="401" r:id="rId6"/>
-    <p:sldId id="406" r:id="rId7"/>
-    <p:sldId id="402" r:id="rId8"/>
-    <p:sldId id="403" r:id="rId9"/>
-    <p:sldId id="395" r:id="rId10"/>
-    <p:sldId id="379" r:id="rId11"/>
+    <p:sldId id="409" r:id="rId5"/>
+    <p:sldId id="410" r:id="rId6"/>
+    <p:sldId id="408" r:id="rId7"/>
+    <p:sldId id="400" r:id="rId8"/>
+    <p:sldId id="401" r:id="rId9"/>
+    <p:sldId id="406" r:id="rId10"/>
+    <p:sldId id="402" r:id="rId11"/>
+    <p:sldId id="403" r:id="rId12"/>
+    <p:sldId id="395" r:id="rId13"/>
+    <p:sldId id="379" r:id="rId14"/>
   </p:sldIdLst>
   <p:sldSz cx="9144000" cy="6858000" type="screen4x3"/>
   <p:notesSz cx="6858000" cy="9144000"/>
   <p:custDataLst>
-    <p:tags r:id="rId14"/>
+    <p:tags r:id="rId17"/>
   </p:custDataLst>
   <p:defaultTextStyle>
     <a:defPPr>
@@ -1953,7 +1956,7 @@
           <a:noFill/>
           <a:extLst>
             <a:ext uri="{909E8E84-426E-40dd-AFC4-6F175D3DCCD1}">
-              <a14:hiddenFill xmlns:a14="http://schemas.microsoft.com/office/drawing/2010/main" xmlns="">
+              <a14:hiddenFill xmlns="" xmlns:a14="http://schemas.microsoft.com/office/drawing/2010/main">
                 <a:solidFill>
                   <a:srgbClr val="FFFFFF"/>
                 </a:solidFill>
@@ -10492,6 +10495,484 @@
             </a:pPr>
             <a:r>
               <a:rPr lang="en-US" dirty="0" smtClean="0"/>
+              <a:t>File </a:t>
+            </a:r>
+            <a:r>
+              <a:rPr lang="en-US" dirty="0" smtClean="0">
+                <a:sym typeface="Wingdings"/>
+              </a:rPr>
+              <a:t> </a:t>
+            </a:r>
+            <a:r>
+              <a:rPr lang="en-US" dirty="0" err="1" smtClean="0">
+                <a:solidFill>
+                  <a:srgbClr val="FF0000"/>
+                </a:solidFill>
+                <a:sym typeface="Wingdings"/>
+              </a:rPr>
+              <a:t>QuoteR</a:t>
+            </a:r>
+            <a:r>
+              <a:rPr lang="en-US" dirty="0" err="1" smtClean="0">
+                <a:solidFill>
+                  <a:srgbClr val="FF0000"/>
+                </a:solidFill>
+                <a:sym typeface="Wingdings"/>
+              </a:rPr>
+              <a:t>educer.js</a:t>
+            </a:r>
+            <a:r>
+              <a:rPr lang="en-US" dirty="0" smtClean="0">
+                <a:sym typeface="Wingdings"/>
+              </a:rPr>
+              <a:t> </a:t>
+            </a:r>
+          </a:p>
+          <a:p>
+            <a:pPr marL="342900" indent="-342900">
+              <a:buFont typeface="Arial" charset="0"/>
+              <a:buChar char="•"/>
+            </a:pPr>
+            <a:endParaRPr lang="en-US" dirty="0" smtClean="0"/>
+          </a:p>
+        </p:txBody>
+      </p:sp>
+      <p:sp>
+        <p:nvSpPr>
+          <p:cNvPr id="3" name="Title 2"/>
+          <p:cNvSpPr>
+            <a:spLocks noGrp="1"/>
+          </p:cNvSpPr>
+          <p:nvPr>
+            <p:ph type="title"/>
+          </p:nvPr>
+        </p:nvSpPr>
+        <p:spPr/>
+        <p:txBody>
+          <a:bodyPr/>
+          <a:lstStyle/>
+          <a:p>
+            <a:r>
+              <a:rPr lang="en-US" dirty="0" smtClean="0"/>
+              <a:t>The New Reducer</a:t>
+            </a:r>
+            <a:endParaRPr lang="en-US" dirty="0"/>
+          </a:p>
+        </p:txBody>
+      </p:sp>
+      <p:pic>
+        <p:nvPicPr>
+          <p:cNvPr id="6" name="Picture 5"/>
+          <p:cNvPicPr>
+            <a:picLocks noChangeAspect="1"/>
+          </p:cNvPicPr>
+          <p:nvPr/>
+        </p:nvPicPr>
+        <p:blipFill>
+          <a:blip r:embed="rId2"/>
+          <a:stretch>
+            <a:fillRect/>
+          </a:stretch>
+        </p:blipFill>
+        <p:spPr>
+          <a:xfrm>
+            <a:off x="546100" y="1752600"/>
+            <a:ext cx="7378700" cy="4507887"/>
+          </a:xfrm>
+          <a:prstGeom prst="rect">
+            <a:avLst/>
+          </a:prstGeom>
+        </p:spPr>
+      </p:pic>
+    </p:spTree>
+    <p:extLst>
+      <p:ext uri="{BB962C8B-B14F-4D97-AF65-F5344CB8AC3E}">
+        <p14:creationId xmlns:p14="http://schemas.microsoft.com/office/powerpoint/2010/main" val="465890312"/>
+      </p:ext>
+    </p:extLst>
+  </p:cSld>
+  <p:clrMapOvr>
+    <a:masterClrMapping/>
+  </p:clrMapOvr>
+  <mc:AlternateContent xmlns:mc="http://schemas.openxmlformats.org/markup-compatibility/2006" xmlns:p14="http://schemas.microsoft.com/office/powerpoint/2010/main">
+    <mc:Choice Requires="p14">
+      <p:transition p14:dur="0"/>
+    </mc:Choice>
+    <mc:Fallback xmlns="">
+      <p:transition/>
+    </mc:Fallback>
+  </mc:AlternateContent>
+  <p:timing>
+    <p:tnLst>
+      <p:par>
+        <p:cTn id="1" dur="indefinite" restart="never" nodeType="tmRoot"/>
+      </p:par>
+    </p:tnLst>
+  </p:timing>
+</p:sld>
+</file>
+
+<file path=ppt/slides/slide11.xml><?xml version="1.0" encoding="utf-8"?>
+<p:sld xmlns:a="http://schemas.openxmlformats.org/drawingml/2006/main" xmlns:r="http://schemas.openxmlformats.org/officeDocument/2006/relationships" xmlns:p="http://schemas.openxmlformats.org/presentationml/2006/main">
+  <p:cSld>
+    <p:spTree>
+      <p:nvGrpSpPr>
+        <p:cNvPr id="1" name=""/>
+        <p:cNvGrpSpPr/>
+        <p:nvPr/>
+      </p:nvGrpSpPr>
+      <p:grpSpPr>
+        <a:xfrm>
+          <a:off x="0" y="0"/>
+          <a:ext cx="0" cy="0"/>
+          <a:chOff x="0" y="0"/>
+          <a:chExt cx="0" cy="0"/>
+        </a:xfrm>
+      </p:grpSpPr>
+      <p:sp>
+        <p:nvSpPr>
+          <p:cNvPr id="2" name="Text Placeholder 1"/>
+          <p:cNvSpPr>
+            <a:spLocks noGrp="1"/>
+          </p:cNvSpPr>
+          <p:nvPr>
+            <p:ph type="body" sz="quarter" idx="12"/>
+          </p:nvPr>
+        </p:nvSpPr>
+        <p:spPr/>
+        <p:txBody>
+          <a:bodyPr/>
+          <a:lstStyle/>
+          <a:p>
+            <a:pPr marL="342900" indent="-342900">
+              <a:buFont typeface="Arial" charset="0"/>
+              <a:buChar char="•"/>
+            </a:pPr>
+            <a:r>
+              <a:rPr lang="en-US" dirty="0" smtClean="0"/>
+              <a:t>Configure the store to add the dispatch() function call</a:t>
+            </a:r>
+          </a:p>
+        </p:txBody>
+      </p:sp>
+      <p:sp>
+        <p:nvSpPr>
+          <p:cNvPr id="3" name="Title 2"/>
+          <p:cNvSpPr>
+            <a:spLocks noGrp="1"/>
+          </p:cNvSpPr>
+          <p:nvPr>
+            <p:ph type="title"/>
+          </p:nvPr>
+        </p:nvSpPr>
+        <p:spPr/>
+        <p:txBody>
+          <a:bodyPr/>
+          <a:lstStyle/>
+          <a:p>
+            <a:r>
+              <a:rPr lang="en-US" dirty="0" smtClean="0"/>
+              <a:t>Configure the store </a:t>
+            </a:r>
+            <a:r>
+              <a:rPr lang="mr-IN" dirty="0" smtClean="0"/>
+              <a:t>–</a:t>
+            </a:r>
+            <a:r>
+              <a:rPr lang="en-US" dirty="0" smtClean="0"/>
+              <a:t> </a:t>
+            </a:r>
+            <a:r>
+              <a:rPr lang="en-US" dirty="0" err="1" smtClean="0"/>
+              <a:t>store.js</a:t>
+            </a:r>
+            <a:endParaRPr lang="en-US" dirty="0"/>
+          </a:p>
+        </p:txBody>
+      </p:sp>
+      <p:pic>
+        <p:nvPicPr>
+          <p:cNvPr id="4" name="Picture 3"/>
+          <p:cNvPicPr>
+            <a:picLocks noChangeAspect="1"/>
+          </p:cNvPicPr>
+          <p:nvPr/>
+        </p:nvPicPr>
+        <p:blipFill>
+          <a:blip r:embed="rId2"/>
+          <a:stretch>
+            <a:fillRect/>
+          </a:stretch>
+        </p:blipFill>
+        <p:spPr>
+          <a:xfrm>
+            <a:off x="468471" y="1828800"/>
+            <a:ext cx="7696200" cy="4772837"/>
+          </a:xfrm>
+          <a:prstGeom prst="rect">
+            <a:avLst/>
+          </a:prstGeom>
+        </p:spPr>
+      </p:pic>
+    </p:spTree>
+    <p:extLst>
+      <p:ext uri="{BB962C8B-B14F-4D97-AF65-F5344CB8AC3E}">
+        <p14:creationId xmlns:p14="http://schemas.microsoft.com/office/powerpoint/2010/main" val="493096822"/>
+      </p:ext>
+    </p:extLst>
+  </p:cSld>
+  <p:clrMapOvr>
+    <a:masterClrMapping/>
+  </p:clrMapOvr>
+  <mc:AlternateContent xmlns:mc="http://schemas.openxmlformats.org/markup-compatibility/2006" xmlns:p14="http://schemas.microsoft.com/office/powerpoint/2010/main">
+    <mc:Choice Requires="p14">
+      <p:transition p14:dur="0"/>
+    </mc:Choice>
+    <mc:Fallback xmlns="">
+      <p:transition/>
+    </mc:Fallback>
+  </mc:AlternateContent>
+  <p:timing>
+    <p:tnLst>
+      <p:par>
+        <p:cTn id="1" dur="indefinite" restart="never" nodeType="tmRoot"/>
+      </p:par>
+    </p:tnLst>
+  </p:timing>
+</p:sld>
+</file>
+
+<file path=ppt/slides/slide12.xml><?xml version="1.0" encoding="utf-8"?>
+<p:sld xmlns:a="http://schemas.openxmlformats.org/drawingml/2006/main" xmlns:r="http://schemas.openxmlformats.org/officeDocument/2006/relationships" xmlns:p="http://schemas.openxmlformats.org/presentationml/2006/main">
+  <p:cSld>
+    <p:spTree>
+      <p:nvGrpSpPr>
+        <p:cNvPr id="1" name=""/>
+        <p:cNvGrpSpPr/>
+        <p:nvPr/>
+      </p:nvGrpSpPr>
+      <p:grpSpPr>
+        <a:xfrm>
+          <a:off x="0" y="0"/>
+          <a:ext cx="0" cy="0"/>
+          <a:chOff x="0" y="0"/>
+          <a:chExt cx="0" cy="0"/>
+        </a:xfrm>
+      </p:grpSpPr>
+      <p:sp>
+        <p:nvSpPr>
+          <p:cNvPr id="2" name="Text Placeholder 1"/>
+          <p:cNvSpPr>
+            <a:spLocks noGrp="1"/>
+          </p:cNvSpPr>
+          <p:nvPr>
+            <p:ph type="body" sz="quarter" idx="12"/>
+          </p:nvPr>
+        </p:nvSpPr>
+        <p:spPr/>
+        <p:txBody>
+          <a:bodyPr/>
+          <a:lstStyle/>
+          <a:p>
+            <a:pPr marL="342900" indent="-342900">
+              <a:buFont typeface="Arial" charset="0"/>
+              <a:buChar char="•"/>
+            </a:pPr>
+            <a:r>
+              <a:rPr lang="en-US" dirty="0" err="1" smtClean="0"/>
+              <a:t>Async</a:t>
+            </a:r>
+            <a:r>
+              <a:rPr lang="en-US" dirty="0" smtClean="0"/>
+              <a:t> requires that the Action</a:t>
+            </a:r>
+          </a:p>
+          <a:p>
+            <a:pPr marL="631825" lvl="1" indent="-342900">
+              <a:buFont typeface="Arial" charset="0"/>
+              <a:buChar char="•"/>
+            </a:pPr>
+            <a:r>
+              <a:rPr lang="en-US" dirty="0" smtClean="0"/>
+              <a:t>Dispatches multiple Action Commands</a:t>
+            </a:r>
+          </a:p>
+          <a:p>
+            <a:pPr marL="631825" lvl="1" indent="-342900">
+              <a:buFont typeface="Arial" charset="0"/>
+              <a:buChar char="•"/>
+            </a:pPr>
+            <a:r>
+              <a:rPr lang="en-US" dirty="0" smtClean="0"/>
+              <a:t>The BEFORE action </a:t>
+            </a:r>
+            <a:r>
+              <a:rPr lang="mr-IN" dirty="0" smtClean="0"/>
+              <a:t>–</a:t>
+            </a:r>
+            <a:r>
+              <a:rPr lang="en-US" dirty="0" smtClean="0"/>
+              <a:t> spinners</a:t>
+            </a:r>
+          </a:p>
+          <a:p>
+            <a:pPr marL="631825" lvl="1" indent="-342900">
+              <a:buFont typeface="Arial" charset="0"/>
+              <a:buChar char="•"/>
+            </a:pPr>
+            <a:r>
+              <a:rPr lang="en-US" dirty="0" smtClean="0"/>
+              <a:t>The ASYNC call</a:t>
+            </a:r>
+          </a:p>
+          <a:p>
+            <a:pPr marL="631825" lvl="1" indent="-342900">
+              <a:buFont typeface="Arial" charset="0"/>
+              <a:buChar char="•"/>
+            </a:pPr>
+            <a:r>
+              <a:rPr lang="en-US" dirty="0" smtClean="0"/>
+              <a:t>The AFTER action</a:t>
+            </a:r>
+          </a:p>
+          <a:p>
+            <a:pPr marL="917575" lvl="2" indent="-342900">
+              <a:buFont typeface="Arial" charset="0"/>
+              <a:buChar char="•"/>
+            </a:pPr>
+            <a:r>
+              <a:rPr lang="en-US" dirty="0" smtClean="0"/>
+              <a:t>Save the data</a:t>
+            </a:r>
+          </a:p>
+          <a:p>
+            <a:pPr marL="917575" lvl="2" indent="-342900">
+              <a:buFont typeface="Arial" charset="0"/>
+              <a:buChar char="•"/>
+            </a:pPr>
+            <a:r>
+              <a:rPr lang="en-US" dirty="0" smtClean="0"/>
+              <a:t>Set the state for</a:t>
+            </a:r>
+          </a:p>
+          <a:p>
+            <a:pPr marL="1203325" lvl="3" indent="-342900">
+              <a:buFont typeface="Arial" charset="0"/>
+              <a:buChar char="•"/>
+            </a:pPr>
+            <a:r>
+              <a:rPr lang="en-US" dirty="0" smtClean="0"/>
+              <a:t>Spinners</a:t>
+            </a:r>
+          </a:p>
+          <a:p>
+            <a:pPr marL="1203325" lvl="3" indent="-342900">
+              <a:buFont typeface="Arial" charset="0"/>
+              <a:buChar char="•"/>
+            </a:pPr>
+            <a:r>
+              <a:rPr lang="en-US" dirty="0" smtClean="0"/>
+              <a:t>Errors</a:t>
+            </a:r>
+          </a:p>
+          <a:p>
+            <a:pPr marL="342900" indent="-342900">
+              <a:buFont typeface="Arial" charset="0"/>
+              <a:buChar char="•"/>
+            </a:pPr>
+            <a:endParaRPr lang="en-US" dirty="0" smtClean="0"/>
+          </a:p>
+        </p:txBody>
+      </p:sp>
+      <p:sp>
+        <p:nvSpPr>
+          <p:cNvPr id="3" name="Title 2"/>
+          <p:cNvSpPr>
+            <a:spLocks noGrp="1"/>
+          </p:cNvSpPr>
+          <p:nvPr>
+            <p:ph type="title"/>
+          </p:nvPr>
+        </p:nvSpPr>
+        <p:spPr/>
+        <p:txBody>
+          <a:bodyPr/>
+          <a:lstStyle/>
+          <a:p>
+            <a:r>
+              <a:rPr lang="en-US" dirty="0" smtClean="0"/>
+              <a:t>Summary</a:t>
+            </a:r>
+            <a:endParaRPr lang="en-US" dirty="0"/>
+          </a:p>
+        </p:txBody>
+      </p:sp>
+    </p:spTree>
+    <p:extLst>
+      <p:ext uri="{BB962C8B-B14F-4D97-AF65-F5344CB8AC3E}">
+        <p14:creationId xmlns:p14="http://schemas.microsoft.com/office/powerpoint/2010/main" val="1482048915"/>
+      </p:ext>
+    </p:extLst>
+  </p:cSld>
+  <p:clrMapOvr>
+    <a:masterClrMapping/>
+  </p:clrMapOvr>
+  <mc:AlternateContent xmlns:mc="http://schemas.openxmlformats.org/markup-compatibility/2006" xmlns:p14="http://schemas.microsoft.com/office/powerpoint/2010/main">
+    <mc:Choice Requires="p14">
+      <p:transition p14:dur="0"/>
+    </mc:Choice>
+    <mc:Fallback xmlns="">
+      <p:transition/>
+    </mc:Fallback>
+  </mc:AlternateContent>
+  <p:timing>
+    <p:tnLst>
+      <p:par>
+        <p:cTn id="1" dur="indefinite" restart="never" nodeType="tmRoot"/>
+      </p:par>
+    </p:tnLst>
+  </p:timing>
+</p:sld>
+</file>
+
+<file path=ppt/slides/slide13.xml><?xml version="1.0" encoding="utf-8"?>
+<p:sld xmlns:a="http://schemas.openxmlformats.org/drawingml/2006/main" xmlns:r="http://schemas.openxmlformats.org/officeDocument/2006/relationships" xmlns:p="http://schemas.openxmlformats.org/presentationml/2006/main">
+  <p:cSld>
+    <p:spTree>
+      <p:nvGrpSpPr>
+        <p:cNvPr id="1" name=""/>
+        <p:cNvGrpSpPr/>
+        <p:nvPr/>
+      </p:nvGrpSpPr>
+      <p:grpSpPr>
+        <a:xfrm>
+          <a:off x="0" y="0"/>
+          <a:ext cx="0" cy="0"/>
+          <a:chOff x="0" y="0"/>
+          <a:chExt cx="0" cy="0"/>
+        </a:xfrm>
+      </p:grpSpPr>
+      <p:sp>
+        <p:nvSpPr>
+          <p:cNvPr id="2" name="Text Placeholder 1"/>
+          <p:cNvSpPr>
+            <a:spLocks noGrp="1"/>
+          </p:cNvSpPr>
+          <p:nvPr>
+            <p:ph type="body" sz="quarter" idx="12"/>
+          </p:nvPr>
+        </p:nvSpPr>
+        <p:spPr/>
+        <p:txBody>
+          <a:bodyPr/>
+          <a:lstStyle/>
+          <a:p>
+            <a:pPr marL="342900" indent="-342900">
+              <a:buFont typeface="Arial" charset="0"/>
+              <a:buChar char="•"/>
+            </a:pPr>
+            <a:r>
+              <a:rPr lang="en-US" dirty="0" smtClean="0"/>
               <a:t>In this lab, you will:</a:t>
             </a:r>
           </a:p>
@@ -10958,7 +11439,15 @@
                   <a:srgbClr val="FF0000"/>
                 </a:solidFill>
               </a:rPr>
-              <a:t>( dispatch, p1, p2 ) =&gt;</a:t>
+              <a:t>( </a:t>
+            </a:r>
+            <a:r>
+              <a:rPr lang="en-US" dirty="0" smtClean="0">
+                <a:solidFill>
+                  <a:srgbClr val="FF0000"/>
+                </a:solidFill>
+              </a:rPr>
+              <a:t>p1, p2 ) =&gt;</a:t>
             </a:r>
             <a:r>
               <a:rPr lang="en-US" dirty="0" smtClean="0"/>
@@ -11159,7 +11648,40 @@
             </a:pPr>
             <a:r>
               <a:rPr lang="en-US" dirty="0" smtClean="0"/>
-              <a:t>In the UI, you probably want to use a spinner (or something)</a:t>
+              <a:t>In the last section, we defined an Action as a Command Object</a:t>
+            </a:r>
+            <a:endParaRPr lang="en-US" dirty="0"/>
+          </a:p>
+          <a:p>
+            <a:pPr marL="342900" indent="-342900">
+              <a:buFont typeface="Arial" charset="0"/>
+              <a:buChar char="•"/>
+            </a:pPr>
+            <a:r>
+              <a:rPr lang="en-US" dirty="0" smtClean="0"/>
+              <a:t>Now, we put all the commands (whoops.. Actions) in a file</a:t>
+            </a:r>
+          </a:p>
+          <a:p>
+            <a:pPr marL="342900" indent="-342900">
+              <a:buFont typeface="Arial" charset="0"/>
+              <a:buChar char="•"/>
+            </a:pPr>
+            <a:r>
+              <a:rPr lang="en-US" dirty="0" smtClean="0"/>
+              <a:t>Then we call a </a:t>
+            </a:r>
+            <a:r>
+              <a:rPr lang="en-US" dirty="0" smtClean="0">
+                <a:solidFill>
+                  <a:srgbClr val="FF0000"/>
+                </a:solidFill>
+              </a:rPr>
+              <a:t>method()</a:t>
+            </a:r>
+            <a:r>
+              <a:rPr lang="en-US" dirty="0" smtClean="0"/>
+              <a:t> which returns the Action</a:t>
             </a:r>
           </a:p>
           <a:p>
@@ -11169,15 +11691,15 @@
             </a:pPr>
             <a:r>
               <a:rPr lang="en-US" dirty="0" smtClean="0"/>
-              <a:t>Display during the </a:t>
-            </a:r>
-            <a:r>
-              <a:rPr lang="en-US" dirty="0" err="1" smtClean="0"/>
-              <a:t>Async</a:t>
-            </a:r>
-            <a:r>
-              <a:rPr lang="en-US" dirty="0" smtClean="0"/>
-              <a:t> operation</a:t>
+              <a:t>Easier to maintain </a:t>
+            </a:r>
+            <a:r>
+              <a:rPr lang="mr-IN" dirty="0" smtClean="0"/>
+              <a:t>–</a:t>
+            </a:r>
+            <a:r>
+              <a:rPr lang="en-US" dirty="0" smtClean="0"/>
+              <a:t> De-coupling</a:t>
             </a:r>
           </a:p>
           <a:p>
@@ -11187,241 +11709,8 @@
             </a:pPr>
             <a:r>
               <a:rPr lang="en-US" dirty="0" smtClean="0"/>
-              <a:t>Hide after the </a:t>
-            </a:r>
-            <a:r>
-              <a:rPr lang="en-US" dirty="0" err="1" smtClean="0"/>
-              <a:t>Async</a:t>
-            </a:r>
-            <a:r>
-              <a:rPr lang="en-US" dirty="0" smtClean="0"/>
-              <a:t> finishes</a:t>
-            </a:r>
-          </a:p>
-          <a:p>
-            <a:pPr marL="631825" lvl="1" indent="-342900">
-              <a:buFont typeface="Arial" charset="0"/>
-              <a:buChar char="•"/>
-            </a:pPr>
-            <a:r>
-              <a:rPr lang="en-US" dirty="0" smtClean="0"/>
-              <a:t>Handle </a:t>
-            </a:r>
-            <a:r>
-              <a:rPr lang="en-US" dirty="0" err="1" smtClean="0"/>
-              <a:t>Async</a:t>
-            </a:r>
-            <a:r>
-              <a:rPr lang="en-US" dirty="0" smtClean="0"/>
-              <a:t> error messages</a:t>
-            </a:r>
-          </a:p>
-          <a:p>
-            <a:pPr marL="342900" indent="-342900">
-              <a:buFont typeface="Arial" charset="0"/>
-              <a:buChar char="•"/>
-            </a:pPr>
-            <a:r>
-              <a:rPr lang="en-US" dirty="0" smtClean="0"/>
-              <a:t>The component needs another property</a:t>
-            </a:r>
-          </a:p>
-          <a:p>
-            <a:pPr marL="631825" lvl="1" indent="-342900">
-              <a:buFont typeface="Arial" charset="0"/>
-              <a:buChar char="•"/>
-            </a:pPr>
-            <a:r>
-              <a:rPr lang="en-US" dirty="0" smtClean="0"/>
-              <a:t>Indicates in the middle of </a:t>
-            </a:r>
-            <a:r>
-              <a:rPr lang="en-US" dirty="0" err="1" smtClean="0"/>
-              <a:t>Async</a:t>
-            </a:r>
-            <a:r>
-              <a:rPr lang="en-US" dirty="0" smtClean="0"/>
-              <a:t> (using the property ‘</a:t>
-            </a:r>
-            <a:r>
-              <a:rPr lang="en-US" dirty="0" err="1" smtClean="0"/>
-              <a:t>isDelayed</a:t>
-            </a:r>
-            <a:r>
-              <a:rPr lang="en-US" dirty="0" smtClean="0"/>
-              <a:t>’)</a:t>
-            </a:r>
-          </a:p>
-          <a:p>
-            <a:pPr marL="342900" indent="-342900">
-              <a:buFont typeface="Arial" charset="0"/>
-              <a:buChar char="•"/>
-            </a:pPr>
-            <a:r>
-              <a:rPr lang="en-US" dirty="0" smtClean="0"/>
-              <a:t>So the </a:t>
-            </a:r>
-            <a:r>
-              <a:rPr lang="en-US" dirty="0" err="1" smtClean="0">
-                <a:solidFill>
-                  <a:srgbClr val="FF0000"/>
-                </a:solidFill>
-              </a:rPr>
-              <a:t>saveQuote</a:t>
-            </a:r>
-            <a:r>
-              <a:rPr lang="en-US" dirty="0" smtClean="0">
-                <a:solidFill>
-                  <a:srgbClr val="FF0000"/>
-                </a:solidFill>
-              </a:rPr>
-              <a:t>()</a:t>
-            </a:r>
-            <a:r>
-              <a:rPr lang="en-US" dirty="0" smtClean="0"/>
-              <a:t> action now becomes THREE actions</a:t>
-            </a:r>
-          </a:p>
-          <a:p>
-            <a:pPr marL="631825" lvl="1" indent="-342900">
-              <a:buFont typeface="Arial" charset="0"/>
-              <a:buChar char="•"/>
-            </a:pPr>
-            <a:r>
-              <a:rPr lang="en-US" dirty="0" smtClean="0"/>
-              <a:t>The </a:t>
-            </a:r>
-            <a:r>
-              <a:rPr lang="en-US" dirty="0" err="1" smtClean="0">
-                <a:solidFill>
-                  <a:srgbClr val="FF0000"/>
-                </a:solidFill>
-              </a:rPr>
-              <a:t>saveQuote</a:t>
-            </a:r>
-            <a:r>
-              <a:rPr lang="en-US" dirty="0" smtClean="0">
-                <a:solidFill>
-                  <a:srgbClr val="FF0000"/>
-                </a:solidFill>
-              </a:rPr>
-              <a:t>( dispatch, name, quote )</a:t>
-            </a:r>
-          </a:p>
-          <a:p>
-            <a:pPr marL="917575" lvl="2" indent="-342900">
-              <a:buFont typeface="Arial" charset="0"/>
-              <a:buChar char="•"/>
-            </a:pPr>
-            <a:r>
-              <a:rPr lang="en-US" dirty="0" smtClean="0"/>
-              <a:t>Now dispatches the other two</a:t>
-            </a:r>
-          </a:p>
-          <a:p>
-            <a:pPr marL="631825" lvl="1" indent="-342900">
-              <a:buFont typeface="Arial" charset="0"/>
-              <a:buChar char="•"/>
-            </a:pPr>
-            <a:r>
-              <a:rPr lang="en-US" dirty="0" smtClean="0"/>
-              <a:t>The </a:t>
-            </a:r>
-            <a:r>
-              <a:rPr lang="en-US" dirty="0" err="1" smtClean="0">
-                <a:solidFill>
-                  <a:srgbClr val="FF0000"/>
-                </a:solidFill>
-              </a:rPr>
-              <a:t>requestQuote</a:t>
-            </a:r>
-            <a:r>
-              <a:rPr lang="en-US" dirty="0" smtClean="0">
-                <a:solidFill>
-                  <a:srgbClr val="FF0000"/>
-                </a:solidFill>
-              </a:rPr>
-              <a:t>(dispatch)</a:t>
-            </a:r>
-            <a:r>
-              <a:rPr lang="en-US" dirty="0" smtClean="0"/>
-              <a:t> which sets a property </a:t>
-            </a:r>
-            <a:r>
-              <a:rPr lang="en-US" dirty="0" smtClean="0">
-                <a:solidFill>
-                  <a:srgbClr val="FF0000"/>
-                </a:solidFill>
-              </a:rPr>
-              <a:t>’</a:t>
-            </a:r>
-            <a:r>
-              <a:rPr lang="en-US" dirty="0" err="1" smtClean="0">
-                <a:solidFill>
-                  <a:srgbClr val="FF0000"/>
-                </a:solidFill>
-              </a:rPr>
-              <a:t>isDelayed</a:t>
-            </a:r>
-            <a:r>
-              <a:rPr lang="en-US" dirty="0" smtClean="0"/>
-              <a:t>’ to TRUE</a:t>
-            </a:r>
-          </a:p>
-          <a:p>
-            <a:pPr marL="917575" lvl="2" indent="-342900">
-              <a:buFont typeface="Arial" charset="0"/>
-              <a:buChar char="•"/>
-            </a:pPr>
-            <a:r>
-              <a:rPr lang="en-US" dirty="0" smtClean="0"/>
-              <a:t>This is BEFORE the </a:t>
-            </a:r>
-            <a:r>
-              <a:rPr lang="en-US" dirty="0" err="1" smtClean="0"/>
-              <a:t>async</a:t>
-            </a:r>
-            <a:r>
-              <a:rPr lang="en-US" dirty="0" smtClean="0"/>
-              <a:t> call</a:t>
-            </a:r>
-          </a:p>
-          <a:p>
-            <a:pPr marL="631825" lvl="1" indent="-342900">
-              <a:buFont typeface="Arial" charset="0"/>
-              <a:buChar char="•"/>
-            </a:pPr>
-            <a:r>
-              <a:rPr lang="en-US" dirty="0" smtClean="0"/>
-              <a:t>The </a:t>
-            </a:r>
-            <a:r>
-              <a:rPr lang="en-US" dirty="0" err="1" smtClean="0">
-                <a:solidFill>
-                  <a:srgbClr val="FF0000"/>
-                </a:solidFill>
-              </a:rPr>
-              <a:t>receiveQuote</a:t>
-            </a:r>
-            <a:r>
-              <a:rPr lang="en-US" dirty="0" smtClean="0">
-                <a:solidFill>
-                  <a:srgbClr val="FF0000"/>
-                </a:solidFill>
-              </a:rPr>
-              <a:t>( dispatch, name, quote )</a:t>
-            </a:r>
-            <a:r>
-              <a:rPr lang="en-US" dirty="0" smtClean="0"/>
-              <a:t> which does the old save</a:t>
-            </a:r>
-          </a:p>
-          <a:p>
-            <a:pPr marL="631825" lvl="1" indent="-342900">
-              <a:buFont typeface="Arial" charset="0"/>
-              <a:buChar char="•"/>
-            </a:pPr>
-            <a:endParaRPr lang="en-US" dirty="0" smtClean="0"/>
+              <a:t>Can change the Action without changing the caller</a:t>
+            </a:r>
           </a:p>
         </p:txBody>
       </p:sp>
@@ -11442,24 +11731,152 @@
           <a:p>
             <a:r>
               <a:rPr lang="en-US" dirty="0" smtClean="0"/>
-              <a:t>UI </a:t>
-            </a:r>
-            <a:r>
-              <a:rPr lang="en-US" dirty="0" err="1" smtClean="0"/>
-              <a:t>Async</a:t>
-            </a:r>
-            <a:r>
-              <a:rPr lang="en-US" dirty="0" smtClean="0"/>
-              <a:t> Issues</a:t>
+              <a:t>Redux Actions Revisited</a:t>
             </a:r>
             <a:endParaRPr lang="en-US" dirty="0"/>
           </a:p>
         </p:txBody>
       </p:sp>
+      <p:pic>
+        <p:nvPicPr>
+          <p:cNvPr id="12" name="Picture 11"/>
+          <p:cNvPicPr>
+            <a:picLocks noChangeAspect="1"/>
+          </p:cNvPicPr>
+          <p:nvPr/>
+        </p:nvPicPr>
+        <p:blipFill>
+          <a:blip r:embed="rId2"/>
+          <a:stretch>
+            <a:fillRect/>
+          </a:stretch>
+        </p:blipFill>
+        <p:spPr>
+          <a:xfrm>
+            <a:off x="609600" y="3502123"/>
+            <a:ext cx="5143500" cy="2527300"/>
+          </a:xfrm>
+          <a:prstGeom prst="rect">
+            <a:avLst/>
+          </a:prstGeom>
+        </p:spPr>
+      </p:pic>
+      <p:grpSp>
+        <p:nvGrpSpPr>
+          <p:cNvPr id="5" name="Group 4"/>
+          <p:cNvGrpSpPr/>
+          <p:nvPr/>
+        </p:nvGrpSpPr>
+        <p:grpSpPr>
+          <a:xfrm>
+            <a:off x="3886200" y="4350275"/>
+            <a:ext cx="4554019" cy="830997"/>
+            <a:chOff x="3784868" y="3614559"/>
+            <a:chExt cx="4554019" cy="830997"/>
+          </a:xfrm>
+        </p:grpSpPr>
+        <p:cxnSp>
+          <p:nvCxnSpPr>
+            <p:cNvPr id="6" name="Straight Arrow Connector 5"/>
+            <p:cNvCxnSpPr/>
+            <p:nvPr/>
+          </p:nvCxnSpPr>
+          <p:spPr>
+            <a:xfrm flipH="1" flipV="1">
+              <a:off x="3784868" y="3614559"/>
+              <a:ext cx="1371600" cy="145525"/>
+            </a:xfrm>
+            <a:prstGeom prst="straightConnector1">
+              <a:avLst/>
+            </a:prstGeom>
+            <a:ln w="38100">
+              <a:solidFill>
+                <a:srgbClr val="FF0000"/>
+              </a:solidFill>
+              <a:tailEnd type="triangle"/>
+            </a:ln>
+          </p:spPr>
+          <p:style>
+            <a:lnRef idx="1">
+              <a:schemeClr val="accent1"/>
+            </a:lnRef>
+            <a:fillRef idx="0">
+              <a:schemeClr val="accent1"/>
+            </a:fillRef>
+            <a:effectRef idx="0">
+              <a:schemeClr val="accent1"/>
+            </a:effectRef>
+            <a:fontRef idx="minor">
+              <a:schemeClr val="tx1"/>
+            </a:fontRef>
+          </p:style>
+        </p:cxnSp>
+        <p:sp>
+          <p:nvSpPr>
+            <p:cNvPr id="7" name="TextBox 6"/>
+            <p:cNvSpPr txBox="1"/>
+            <p:nvPr/>
+          </p:nvSpPr>
+          <p:spPr>
+            <a:xfrm>
+              <a:off x="5314021" y="3614559"/>
+              <a:ext cx="3024866" cy="830997"/>
+            </a:xfrm>
+            <a:prstGeom prst="rect">
+              <a:avLst/>
+            </a:prstGeom>
+            <a:noFill/>
+          </p:spPr>
+          <p:txBody>
+            <a:bodyPr wrap="none" lIns="0" tIns="0" rIns="0" bIns="0" rtlCol="0">
+              <a:spAutoFit/>
+            </a:bodyPr>
+            <a:lstStyle/>
+            <a:p>
+              <a:pPr algn="ctr"/>
+              <a:r>
+                <a:rPr lang="en-US" dirty="0" smtClean="0">
+                  <a:solidFill>
+                    <a:srgbClr val="FF0000"/>
+                  </a:solidFill>
+                </a:rPr>
+                <a:t>Usually defined as a Constant</a:t>
+              </a:r>
+            </a:p>
+            <a:p>
+              <a:pPr algn="ctr"/>
+              <a:r>
+                <a:rPr lang="en-US" dirty="0" smtClean="0">
+                  <a:solidFill>
+                    <a:srgbClr val="FF0000"/>
+                  </a:solidFill>
+                </a:rPr>
+                <a:t>In a different file.  Shared with </a:t>
+              </a:r>
+              <a:endParaRPr lang="en-US" dirty="0">
+                <a:solidFill>
+                  <a:srgbClr val="FF0000"/>
+                </a:solidFill>
+              </a:endParaRPr>
+            </a:p>
+            <a:p>
+              <a:pPr algn="ctr"/>
+              <a:r>
+                <a:rPr lang="en-US" dirty="0" smtClean="0">
+                  <a:solidFill>
+                    <a:srgbClr val="FF0000"/>
+                  </a:solidFill>
+                </a:rPr>
+                <a:t>the reducer.</a:t>
+              </a:r>
+            </a:p>
+          </p:txBody>
+        </p:sp>
+      </p:grpSp>
     </p:spTree>
     <p:extLst>
       <p:ext uri="{BB962C8B-B14F-4D97-AF65-F5344CB8AC3E}">
-        <p14:creationId xmlns:p14="http://schemas.microsoft.com/office/powerpoint/2010/main" val="814591797"/>
+        <p14:creationId xmlns:p14="http://schemas.microsoft.com/office/powerpoint/2010/main" val="1548737407"/>
       </p:ext>
     </p:extLst>
   </p:cSld>
@@ -11501,30 +11918,6 @@
           <a:chExt cx="0" cy="0"/>
         </a:xfrm>
       </p:grpSpPr>
-      <p:pic>
-        <p:nvPicPr>
-          <p:cNvPr id="12" name="Picture 11"/>
-          <p:cNvPicPr>
-            <a:picLocks noChangeAspect="1"/>
-          </p:cNvPicPr>
-          <p:nvPr/>
-        </p:nvPicPr>
-        <p:blipFill>
-          <a:blip r:embed="rId2"/>
-          <a:stretch>
-            <a:fillRect/>
-          </a:stretch>
-        </p:blipFill>
-        <p:spPr>
-          <a:xfrm>
-            <a:off x="381000" y="1828800"/>
-            <a:ext cx="6186286" cy="4451350"/>
-          </a:xfrm>
-          <a:prstGeom prst="rect">
-            <a:avLst/>
-          </a:prstGeom>
-        </p:spPr>
-      </p:pic>
       <p:sp>
         <p:nvSpPr>
           <p:cNvPr id="2" name="Text Placeholder 1"/>
@@ -11545,18 +11938,89 @@
               <a:buChar char="•"/>
             </a:pPr>
             <a:r>
-              <a:rPr lang="en-US" b="1" dirty="0" smtClean="0">
-                <a:solidFill>
-                  <a:srgbClr val="000080"/>
+              <a:rPr lang="en-US" dirty="0" smtClean="0"/>
+              <a:t>Defines all the strings shared by the Action and the Reducer</a:t>
+            </a:r>
+          </a:p>
+          <a:p>
+            <a:pPr marL="342900" indent="-342900">
+              <a:buFont typeface="Arial" charset="0"/>
+              <a:buChar char="•"/>
+            </a:pPr>
+            <a:r>
+              <a:rPr lang="en-US" dirty="0" smtClean="0"/>
+              <a:t>Action sends as the type</a:t>
+            </a:r>
+          </a:p>
+          <a:p>
+            <a:pPr marL="342900" indent="-342900">
+              <a:buFont typeface="Arial" charset="0"/>
+              <a:buChar char="•"/>
+            </a:pPr>
+            <a:r>
+              <a:rPr lang="en-US" dirty="0" smtClean="0"/>
+              <a:t>Reducer uses in the </a:t>
+            </a:r>
+            <a:r>
+              <a:rPr lang="en-US" dirty="0" smtClean="0">
+                <a:solidFill>
+                  <a:srgbClr val="FF0000"/>
                 </a:solidFill>
               </a:rPr>
+              <a:t>switch( </a:t>
+            </a:r>
+            <a:r>
+              <a:rPr lang="en-US" dirty="0" err="1" smtClean="0">
+                <a:solidFill>
+                  <a:srgbClr val="FF0000"/>
+                </a:solidFill>
+              </a:rPr>
+              <a:t>action.type</a:t>
+            </a:r>
+            <a:r>
+              <a:rPr lang="en-US" dirty="0" smtClean="0">
+                <a:solidFill>
+                  <a:srgbClr val="FF0000"/>
+                </a:solidFill>
+              </a:rPr>
+              <a:t> )</a:t>
+            </a:r>
+            <a:r>
+              <a:rPr lang="en-US" dirty="0" smtClean="0"/>
+              <a:t> statement</a:t>
+            </a:r>
+          </a:p>
+          <a:p>
+            <a:pPr marL="342900" indent="-342900">
+              <a:buFont typeface="Arial" charset="0"/>
+              <a:buChar char="•"/>
+            </a:pPr>
+            <a:r>
+              <a:rPr lang="en-US" dirty="0" smtClean="0"/>
+              <a:t>Must be unique in the application</a:t>
+            </a:r>
+          </a:p>
+          <a:p>
+            <a:pPr marL="631825" lvl="1" indent="-342900">
+              <a:buFont typeface="Arial" charset="0"/>
+              <a:buChar char="•"/>
+            </a:pPr>
+            <a:r>
+              <a:rPr lang="en-US" dirty="0" smtClean="0"/>
+              <a:t>Convention is the Object first (e.g. QUOTE )</a:t>
+            </a:r>
+          </a:p>
+          <a:p>
+            <a:pPr marL="342900" indent="-342900">
+              <a:buFont typeface="Arial" charset="0"/>
+              <a:buChar char="•"/>
+            </a:pPr>
+            <a:r>
+              <a:rPr lang="en-US" dirty="0" smtClean="0"/>
               <a:t>File </a:t>
             </a:r>
             <a:r>
-              <a:rPr lang="en-US" b="1" dirty="0" smtClean="0">
-                <a:solidFill>
-                  <a:srgbClr val="000080"/>
-                </a:solidFill>
+              <a:rPr lang="en-US" dirty="0" smtClean="0">
                 <a:sym typeface="Wingdings"/>
               </a:rPr>
               <a:t> </a:t>
@@ -11568,24 +12032,21 @@
                 </a:solidFill>
                 <a:sym typeface="Wingdings"/>
               </a:rPr>
-              <a:t>actions.js</a:t>
-            </a:r>
-            <a:r>
-              <a:rPr lang="en-US" b="1" dirty="0" smtClean="0">
-                <a:solidFill>
-                  <a:srgbClr val="000080"/>
-                </a:solidFill>
+              <a:t>QuoteConstants.js</a:t>
+            </a:r>
+            <a:r>
+              <a:rPr lang="en-US" dirty="0" smtClean="0">
                 <a:sym typeface="Wingdings"/>
               </a:rPr>
               <a:t> </a:t>
             </a:r>
-            <a:r>
-              <a:rPr lang="en-US" dirty="0"/>
-              <a:t/>
-            </a:r>
-            <a:br>
-              <a:rPr lang="en-US" dirty="0"/>
-            </a:br>
+            <a:endParaRPr lang="en-US" dirty="0" smtClean="0"/>
+          </a:p>
+          <a:p>
+            <a:pPr marL="342900" indent="-342900">
+              <a:buFont typeface="Arial" charset="0"/>
+              <a:buChar char="•"/>
+            </a:pPr>
             <a:endParaRPr lang="en-US" dirty="0" smtClean="0"/>
           </a:p>
         </p:txBody>
@@ -11607,12 +12068,798 @@
           <a:p>
             <a:r>
               <a:rPr lang="en-US" dirty="0" smtClean="0"/>
-              <a:t>The New Actions</a:t>
+              <a:t>Action Constants</a:t>
             </a:r>
             <a:endParaRPr lang="en-US" dirty="0"/>
           </a:p>
         </p:txBody>
       </p:sp>
+      <p:pic>
+        <p:nvPicPr>
+          <p:cNvPr id="8" name="Picture 7"/>
+          <p:cNvPicPr>
+            <a:picLocks noChangeAspect="1"/>
+          </p:cNvPicPr>
+          <p:nvPr/>
+        </p:nvPicPr>
+        <p:blipFill>
+          <a:blip r:embed="rId2"/>
+          <a:stretch>
+            <a:fillRect/>
+          </a:stretch>
+        </p:blipFill>
+        <p:spPr>
+          <a:xfrm>
+            <a:off x="1219200" y="4318000"/>
+            <a:ext cx="5562600" cy="1397000"/>
+          </a:xfrm>
+          <a:prstGeom prst="rect">
+            <a:avLst/>
+          </a:prstGeom>
+        </p:spPr>
+      </p:pic>
+    </p:spTree>
+    <p:extLst>
+      <p:ext uri="{BB962C8B-B14F-4D97-AF65-F5344CB8AC3E}">
+        <p14:creationId xmlns:p14="http://schemas.microsoft.com/office/powerpoint/2010/main" val="1729659157"/>
+      </p:ext>
+    </p:extLst>
+  </p:cSld>
+  <p:clrMapOvr>
+    <a:masterClrMapping/>
+  </p:clrMapOvr>
+  <mc:AlternateContent xmlns:mc="http://schemas.openxmlformats.org/markup-compatibility/2006" xmlns:p14="http://schemas.microsoft.com/office/powerpoint/2010/main">
+    <mc:Choice Requires="p14">
+      <p:transition p14:dur="0"/>
+    </mc:Choice>
+    <mc:Fallback xmlns="">
+      <p:transition/>
+    </mc:Fallback>
+  </mc:AlternateContent>
+  <p:timing>
+    <p:tnLst>
+      <p:par>
+        <p:cTn id="1" dur="indefinite" restart="never" nodeType="tmRoot"/>
+      </p:par>
+    </p:tnLst>
+  </p:timing>
+</p:sld>
+</file>
+
+<file path=ppt/slides/slide6.xml><?xml version="1.0" encoding="utf-8"?>
+<p:sld xmlns:a="http://schemas.openxmlformats.org/drawingml/2006/main" xmlns:r="http://schemas.openxmlformats.org/officeDocument/2006/relationships" xmlns:p="http://schemas.openxmlformats.org/presentationml/2006/main">
+  <p:cSld>
+    <p:spTree>
+      <p:nvGrpSpPr>
+        <p:cNvPr id="1" name=""/>
+        <p:cNvGrpSpPr/>
+        <p:nvPr/>
+      </p:nvGrpSpPr>
+      <p:grpSpPr>
+        <a:xfrm>
+          <a:off x="0" y="0"/>
+          <a:ext cx="0" cy="0"/>
+          <a:chOff x="0" y="0"/>
+          <a:chExt cx="0" cy="0"/>
+        </a:xfrm>
+      </p:grpSpPr>
+      <p:sp>
+        <p:nvSpPr>
+          <p:cNvPr id="2" name="Text Placeholder 1"/>
+          <p:cNvSpPr>
+            <a:spLocks noGrp="1"/>
+          </p:cNvSpPr>
+          <p:nvPr>
+            <p:ph type="body" sz="quarter" idx="12"/>
+          </p:nvPr>
+        </p:nvSpPr>
+        <p:spPr/>
+        <p:txBody>
+          <a:bodyPr/>
+          <a:lstStyle/>
+          <a:p>
+            <a:pPr marL="342900" indent="-342900">
+              <a:buFont typeface="Arial" charset="0"/>
+              <a:buChar char="•"/>
+            </a:pPr>
+            <a:r>
+              <a:rPr lang="en-US" dirty="0" smtClean="0"/>
+              <a:t>A THUNK is a function that returns a function</a:t>
+            </a:r>
+          </a:p>
+          <a:p>
+            <a:pPr marL="342900" indent="-342900">
+              <a:buFont typeface="Arial" charset="0"/>
+              <a:buChar char="•"/>
+            </a:pPr>
+            <a:r>
+              <a:rPr lang="en-US" dirty="0" smtClean="0"/>
+              <a:t>If we pass a Function to the </a:t>
+            </a:r>
+            <a:r>
+              <a:rPr lang="en-US" dirty="0" smtClean="0">
+                <a:solidFill>
+                  <a:srgbClr val="FF0000"/>
+                </a:solidFill>
+              </a:rPr>
+              <a:t>dispatch()</a:t>
+            </a:r>
+            <a:r>
+              <a:rPr lang="en-US" dirty="0" smtClean="0"/>
+              <a:t> method</a:t>
+            </a:r>
+          </a:p>
+          <a:p>
+            <a:pPr marL="631825" lvl="1" indent="-342900">
+              <a:buFont typeface="Arial" charset="0"/>
+              <a:buChar char="•"/>
+            </a:pPr>
+            <a:r>
+              <a:rPr lang="en-US" dirty="0" smtClean="0"/>
+              <a:t>It calls the Function with </a:t>
+            </a:r>
+            <a:r>
+              <a:rPr lang="en-US" dirty="0" smtClean="0">
+                <a:solidFill>
+                  <a:srgbClr val="FF0000"/>
+                </a:solidFill>
+              </a:rPr>
+              <a:t>dispatch</a:t>
+            </a:r>
+            <a:r>
+              <a:rPr lang="en-US" dirty="0" smtClean="0"/>
+              <a:t> as a parameter</a:t>
+            </a:r>
+          </a:p>
+          <a:p>
+            <a:pPr marL="631825" lvl="1" indent="-342900">
+              <a:buFont typeface="Arial" charset="0"/>
+              <a:buChar char="•"/>
+            </a:pPr>
+            <a:r>
+              <a:rPr lang="en-US" dirty="0" smtClean="0"/>
+              <a:t>This allows us to make multiple </a:t>
+            </a:r>
+            <a:r>
+              <a:rPr lang="en-US" dirty="0" smtClean="0">
+                <a:solidFill>
+                  <a:srgbClr val="FF0000"/>
+                </a:solidFill>
+              </a:rPr>
+              <a:t>dispatch()</a:t>
+            </a:r>
+            <a:r>
+              <a:rPr lang="en-US" dirty="0" err="1" smtClean="0"/>
+              <a:t>es</a:t>
+            </a:r>
+            <a:r>
+              <a:rPr lang="en-US" dirty="0" smtClean="0"/>
+              <a:t> to React</a:t>
+            </a:r>
+            <a:endParaRPr lang="en-US" dirty="0" smtClean="0"/>
+          </a:p>
+        </p:txBody>
+      </p:sp>
+      <p:sp>
+        <p:nvSpPr>
+          <p:cNvPr id="3" name="Title 2"/>
+          <p:cNvSpPr>
+            <a:spLocks noGrp="1"/>
+          </p:cNvSpPr>
+          <p:nvPr>
+            <p:ph type="title"/>
+          </p:nvPr>
+        </p:nvSpPr>
+        <p:spPr/>
+        <p:txBody>
+          <a:bodyPr/>
+          <a:lstStyle/>
+          <a:p>
+            <a:r>
+              <a:rPr lang="en-US" dirty="0" smtClean="0"/>
+              <a:t>Redux </a:t>
+            </a:r>
+            <a:r>
+              <a:rPr lang="en-US" dirty="0" err="1" smtClean="0"/>
+              <a:t>Thunk</a:t>
+            </a:r>
+            <a:endParaRPr lang="en-US" dirty="0"/>
+          </a:p>
+        </p:txBody>
+      </p:sp>
+      <p:pic>
+        <p:nvPicPr>
+          <p:cNvPr id="6" name="Picture 5"/>
+          <p:cNvPicPr>
+            <a:picLocks noChangeAspect="1"/>
+          </p:cNvPicPr>
+          <p:nvPr/>
+        </p:nvPicPr>
+        <p:blipFill>
+          <a:blip r:embed="rId2"/>
+          <a:stretch>
+            <a:fillRect/>
+          </a:stretch>
+        </p:blipFill>
+        <p:spPr>
+          <a:xfrm>
+            <a:off x="685800" y="3276600"/>
+            <a:ext cx="5994400" cy="2768600"/>
+          </a:xfrm>
+          <a:prstGeom prst="rect">
+            <a:avLst/>
+          </a:prstGeom>
+        </p:spPr>
+      </p:pic>
+    </p:spTree>
+    <p:extLst>
+      <p:ext uri="{BB962C8B-B14F-4D97-AF65-F5344CB8AC3E}">
+        <p14:creationId xmlns:p14="http://schemas.microsoft.com/office/powerpoint/2010/main" val="1494066810"/>
+      </p:ext>
+    </p:extLst>
+  </p:cSld>
+  <p:clrMapOvr>
+    <a:masterClrMapping/>
+  </p:clrMapOvr>
+  <mc:AlternateContent xmlns:mc="http://schemas.openxmlformats.org/markup-compatibility/2006" xmlns:p14="http://schemas.microsoft.com/office/powerpoint/2010/main">
+    <mc:Choice Requires="p14">
+      <p:transition p14:dur="0"/>
+    </mc:Choice>
+    <mc:Fallback xmlns="">
+      <p:transition/>
+    </mc:Fallback>
+  </mc:AlternateContent>
+  <p:timing>
+    <p:tnLst>
+      <p:par>
+        <p:cTn id="1" dur="indefinite" restart="never" nodeType="tmRoot"/>
+      </p:par>
+    </p:tnLst>
+  </p:timing>
+</p:sld>
+</file>
+
+<file path=ppt/slides/slide7.xml><?xml version="1.0" encoding="utf-8"?>
+<p:sld xmlns:a="http://schemas.openxmlformats.org/drawingml/2006/main" xmlns:r="http://schemas.openxmlformats.org/officeDocument/2006/relationships" xmlns:p="http://schemas.openxmlformats.org/presentationml/2006/main">
+  <p:cSld>
+    <p:spTree>
+      <p:nvGrpSpPr>
+        <p:cNvPr id="1" name=""/>
+        <p:cNvGrpSpPr/>
+        <p:nvPr/>
+      </p:nvGrpSpPr>
+      <p:grpSpPr>
+        <a:xfrm>
+          <a:off x="0" y="0"/>
+          <a:ext cx="0" cy="0"/>
+          <a:chOff x="0" y="0"/>
+          <a:chExt cx="0" cy="0"/>
+        </a:xfrm>
+      </p:grpSpPr>
+      <p:sp>
+        <p:nvSpPr>
+          <p:cNvPr id="2" name="Text Placeholder 1"/>
+          <p:cNvSpPr>
+            <a:spLocks noGrp="1"/>
+          </p:cNvSpPr>
+          <p:nvPr>
+            <p:ph type="body" sz="quarter" idx="12"/>
+          </p:nvPr>
+        </p:nvSpPr>
+        <p:spPr/>
+        <p:txBody>
+          <a:bodyPr/>
+          <a:lstStyle/>
+          <a:p>
+            <a:pPr marL="342900" indent="-342900">
+              <a:buFont typeface="Arial" charset="0"/>
+              <a:buChar char="•"/>
+            </a:pPr>
+            <a:r>
+              <a:rPr lang="en-US" dirty="0" smtClean="0"/>
+              <a:t>In the UI, you probably want to use a spinner (or something)</a:t>
+            </a:r>
+          </a:p>
+          <a:p>
+            <a:pPr marL="631825" lvl="1" indent="-342900">
+              <a:buFont typeface="Arial" charset="0"/>
+              <a:buChar char="•"/>
+            </a:pPr>
+            <a:r>
+              <a:rPr lang="en-US" dirty="0" smtClean="0"/>
+              <a:t>Display during the </a:t>
+            </a:r>
+            <a:r>
+              <a:rPr lang="en-US" dirty="0" err="1" smtClean="0"/>
+              <a:t>Async</a:t>
+            </a:r>
+            <a:r>
+              <a:rPr lang="en-US" dirty="0" smtClean="0"/>
+              <a:t> operation</a:t>
+            </a:r>
+          </a:p>
+          <a:p>
+            <a:pPr marL="631825" lvl="1" indent="-342900">
+              <a:buFont typeface="Arial" charset="0"/>
+              <a:buChar char="•"/>
+            </a:pPr>
+            <a:r>
+              <a:rPr lang="en-US" dirty="0" smtClean="0"/>
+              <a:t>Hide after the </a:t>
+            </a:r>
+            <a:r>
+              <a:rPr lang="en-US" dirty="0" err="1" smtClean="0"/>
+              <a:t>Async</a:t>
+            </a:r>
+            <a:r>
+              <a:rPr lang="en-US" dirty="0" smtClean="0"/>
+              <a:t> finishes</a:t>
+            </a:r>
+          </a:p>
+          <a:p>
+            <a:pPr marL="631825" lvl="1" indent="-342900">
+              <a:buFont typeface="Arial" charset="0"/>
+              <a:buChar char="•"/>
+            </a:pPr>
+            <a:r>
+              <a:rPr lang="en-US" dirty="0" smtClean="0"/>
+              <a:t>Handle </a:t>
+            </a:r>
+            <a:r>
+              <a:rPr lang="en-US" dirty="0" err="1" smtClean="0"/>
+              <a:t>Async</a:t>
+            </a:r>
+            <a:r>
+              <a:rPr lang="en-US" dirty="0" smtClean="0"/>
+              <a:t> error messages</a:t>
+            </a:r>
+          </a:p>
+          <a:p>
+            <a:pPr marL="342900" indent="-342900">
+              <a:buFont typeface="Arial" charset="0"/>
+              <a:buChar char="•"/>
+            </a:pPr>
+            <a:r>
+              <a:rPr lang="en-US" dirty="0" smtClean="0"/>
+              <a:t>The component needs another property</a:t>
+            </a:r>
+          </a:p>
+          <a:p>
+            <a:pPr marL="631825" lvl="1" indent="-342900">
+              <a:buFont typeface="Arial" charset="0"/>
+              <a:buChar char="•"/>
+            </a:pPr>
+            <a:r>
+              <a:rPr lang="en-US" dirty="0" smtClean="0"/>
+              <a:t>Indicates in the middle of </a:t>
+            </a:r>
+            <a:r>
+              <a:rPr lang="en-US" dirty="0" err="1" smtClean="0"/>
+              <a:t>Async</a:t>
+            </a:r>
+            <a:r>
+              <a:rPr lang="en-US" dirty="0" smtClean="0"/>
+              <a:t> (using the property ‘</a:t>
+            </a:r>
+            <a:r>
+              <a:rPr lang="en-US" dirty="0" err="1" smtClean="0">
+                <a:solidFill>
+                  <a:srgbClr val="FF0000"/>
+                </a:solidFill>
+              </a:rPr>
+              <a:t>isDelayed</a:t>
+            </a:r>
+            <a:r>
+              <a:rPr lang="en-US" dirty="0" smtClean="0"/>
+              <a:t>’)</a:t>
+            </a:r>
+          </a:p>
+          <a:p>
+            <a:pPr marL="342900" indent="-342900">
+              <a:buFont typeface="Arial" charset="0"/>
+              <a:buChar char="•"/>
+            </a:pPr>
+            <a:r>
+              <a:rPr lang="en-US" dirty="0" smtClean="0"/>
+              <a:t>So the </a:t>
+            </a:r>
+            <a:r>
+              <a:rPr lang="en-US" dirty="0" err="1" smtClean="0">
+                <a:solidFill>
+                  <a:srgbClr val="FF0000"/>
+                </a:solidFill>
+              </a:rPr>
+              <a:t>saveQuote</a:t>
+            </a:r>
+            <a:r>
+              <a:rPr lang="en-US" dirty="0" smtClean="0">
+                <a:solidFill>
+                  <a:srgbClr val="FF0000"/>
+                </a:solidFill>
+              </a:rPr>
+              <a:t>()</a:t>
+            </a:r>
+            <a:r>
+              <a:rPr lang="en-US" dirty="0" smtClean="0"/>
+              <a:t> action now becomes THREE actions</a:t>
+            </a:r>
+          </a:p>
+          <a:p>
+            <a:pPr marL="631825" lvl="1" indent="-342900">
+              <a:buFont typeface="Arial" charset="0"/>
+              <a:buChar char="•"/>
+            </a:pPr>
+            <a:r>
+              <a:rPr lang="en-US" dirty="0" smtClean="0"/>
+              <a:t>The </a:t>
+            </a:r>
+            <a:r>
+              <a:rPr lang="en-US" dirty="0" err="1" smtClean="0">
+                <a:solidFill>
+                  <a:srgbClr val="FF0000"/>
+                </a:solidFill>
+              </a:rPr>
+              <a:t>saveQuote</a:t>
+            </a:r>
+            <a:r>
+              <a:rPr lang="en-US" dirty="0" smtClean="0">
+                <a:solidFill>
+                  <a:srgbClr val="FF0000"/>
+                </a:solidFill>
+              </a:rPr>
+              <a:t>( </a:t>
+            </a:r>
+            <a:r>
+              <a:rPr lang="en-US" dirty="0" smtClean="0">
+                <a:solidFill>
+                  <a:srgbClr val="FF0000"/>
+                </a:solidFill>
+              </a:rPr>
+              <a:t> </a:t>
+            </a:r>
+            <a:r>
+              <a:rPr lang="en-US" dirty="0" smtClean="0">
+                <a:solidFill>
+                  <a:srgbClr val="FF0000"/>
+                </a:solidFill>
+              </a:rPr>
+              <a:t>name, quote )</a:t>
+            </a:r>
+          </a:p>
+          <a:p>
+            <a:pPr marL="917575" lvl="2" indent="-342900">
+              <a:buFont typeface="Arial" charset="0"/>
+              <a:buChar char="•"/>
+            </a:pPr>
+            <a:r>
+              <a:rPr lang="en-US" dirty="0" smtClean="0"/>
+              <a:t>Now dispatches the other two</a:t>
+            </a:r>
+          </a:p>
+          <a:p>
+            <a:pPr marL="631825" lvl="1" indent="-342900">
+              <a:buFont typeface="Arial" charset="0"/>
+              <a:buChar char="•"/>
+            </a:pPr>
+            <a:r>
+              <a:rPr lang="en-US" dirty="0" smtClean="0"/>
+              <a:t>The </a:t>
+            </a:r>
+            <a:r>
+              <a:rPr lang="en-US" dirty="0" err="1" smtClean="0">
+                <a:solidFill>
+                  <a:srgbClr val="FF0000"/>
+                </a:solidFill>
+              </a:rPr>
+              <a:t>requestQuote</a:t>
+            </a:r>
+            <a:r>
+              <a:rPr lang="en-US" dirty="0" smtClean="0">
+                <a:solidFill>
+                  <a:srgbClr val="FF0000"/>
+                </a:solidFill>
+              </a:rPr>
+              <a:t>( )</a:t>
+            </a:r>
+            <a:r>
+              <a:rPr lang="en-US" dirty="0" smtClean="0"/>
+              <a:t> </a:t>
+            </a:r>
+            <a:r>
+              <a:rPr lang="en-US" dirty="0" smtClean="0"/>
+              <a:t>which sets a property </a:t>
+            </a:r>
+            <a:r>
+              <a:rPr lang="en-US" dirty="0" smtClean="0">
+                <a:solidFill>
+                  <a:srgbClr val="FF0000"/>
+                </a:solidFill>
+              </a:rPr>
+              <a:t>’</a:t>
+            </a:r>
+            <a:r>
+              <a:rPr lang="en-US" dirty="0" err="1" smtClean="0">
+                <a:solidFill>
+                  <a:srgbClr val="FF0000"/>
+                </a:solidFill>
+              </a:rPr>
+              <a:t>isDelayed</a:t>
+            </a:r>
+            <a:r>
+              <a:rPr lang="en-US" dirty="0" smtClean="0"/>
+              <a:t>’ to TRUE</a:t>
+            </a:r>
+          </a:p>
+          <a:p>
+            <a:pPr marL="917575" lvl="2" indent="-342900">
+              <a:buFont typeface="Arial" charset="0"/>
+              <a:buChar char="•"/>
+            </a:pPr>
+            <a:r>
+              <a:rPr lang="en-US" dirty="0" smtClean="0"/>
+              <a:t>This is BEFORE the </a:t>
+            </a:r>
+            <a:r>
+              <a:rPr lang="en-US" dirty="0" err="1" smtClean="0"/>
+              <a:t>async</a:t>
+            </a:r>
+            <a:r>
+              <a:rPr lang="en-US" dirty="0" smtClean="0"/>
+              <a:t> call</a:t>
+            </a:r>
+          </a:p>
+          <a:p>
+            <a:pPr marL="631825" lvl="1" indent="-342900">
+              <a:buFont typeface="Arial" charset="0"/>
+              <a:buChar char="•"/>
+            </a:pPr>
+            <a:r>
+              <a:rPr lang="en-US" dirty="0" smtClean="0"/>
+              <a:t>The </a:t>
+            </a:r>
+            <a:r>
+              <a:rPr lang="en-US" dirty="0" err="1" smtClean="0">
+                <a:solidFill>
+                  <a:srgbClr val="FF0000"/>
+                </a:solidFill>
+              </a:rPr>
+              <a:t>receiveQuote</a:t>
+            </a:r>
+            <a:r>
+              <a:rPr lang="en-US" dirty="0" smtClean="0">
+                <a:solidFill>
+                  <a:srgbClr val="FF0000"/>
+                </a:solidFill>
+              </a:rPr>
+              <a:t>( </a:t>
+            </a:r>
+            <a:r>
+              <a:rPr lang="en-US" dirty="0" smtClean="0">
+                <a:solidFill>
+                  <a:srgbClr val="FF0000"/>
+                </a:solidFill>
+              </a:rPr>
+              <a:t> </a:t>
+            </a:r>
+            <a:r>
+              <a:rPr lang="en-US" dirty="0" smtClean="0">
+                <a:solidFill>
+                  <a:srgbClr val="FF0000"/>
+                </a:solidFill>
+              </a:rPr>
+              <a:t>name, quote )</a:t>
+            </a:r>
+            <a:r>
+              <a:rPr lang="en-US" dirty="0" smtClean="0"/>
+              <a:t> which does the old save</a:t>
+            </a:r>
+          </a:p>
+          <a:p>
+            <a:pPr marL="631825" lvl="1" indent="-342900">
+              <a:buFont typeface="Arial" charset="0"/>
+              <a:buChar char="•"/>
+            </a:pPr>
+            <a:endParaRPr lang="en-US" dirty="0" smtClean="0"/>
+          </a:p>
+        </p:txBody>
+      </p:sp>
+      <p:sp>
+        <p:nvSpPr>
+          <p:cNvPr id="3" name="Title 2"/>
+          <p:cNvSpPr>
+            <a:spLocks noGrp="1"/>
+          </p:cNvSpPr>
+          <p:nvPr>
+            <p:ph type="title"/>
+          </p:nvPr>
+        </p:nvSpPr>
+        <p:spPr/>
+        <p:txBody>
+          <a:bodyPr/>
+          <a:lstStyle/>
+          <a:p>
+            <a:r>
+              <a:rPr lang="en-US" dirty="0" smtClean="0"/>
+              <a:t>UI </a:t>
+            </a:r>
+            <a:r>
+              <a:rPr lang="en-US" dirty="0" err="1" smtClean="0"/>
+              <a:t>Async</a:t>
+            </a:r>
+            <a:r>
+              <a:rPr lang="en-US" dirty="0" smtClean="0"/>
+              <a:t> Issues</a:t>
+            </a:r>
+            <a:endParaRPr lang="en-US" dirty="0"/>
+          </a:p>
+        </p:txBody>
+      </p:sp>
+    </p:spTree>
+    <p:extLst>
+      <p:ext uri="{BB962C8B-B14F-4D97-AF65-F5344CB8AC3E}">
+        <p14:creationId xmlns:p14="http://schemas.microsoft.com/office/powerpoint/2010/main" val="814591797"/>
+      </p:ext>
+    </p:extLst>
+  </p:cSld>
+  <p:clrMapOvr>
+    <a:masterClrMapping/>
+  </p:clrMapOvr>
+  <mc:AlternateContent xmlns:mc="http://schemas.openxmlformats.org/markup-compatibility/2006" xmlns:p14="http://schemas.microsoft.com/office/powerpoint/2010/main">
+    <mc:Choice Requires="p14">
+      <p:transition p14:dur="0"/>
+    </mc:Choice>
+    <mc:Fallback xmlns="">
+      <p:transition/>
+    </mc:Fallback>
+  </mc:AlternateContent>
+  <p:timing>
+    <p:tnLst>
+      <p:par>
+        <p:cTn id="1" dur="indefinite" restart="never" nodeType="tmRoot"/>
+      </p:par>
+    </p:tnLst>
+  </p:timing>
+</p:sld>
+</file>
+
+<file path=ppt/slides/slide8.xml><?xml version="1.0" encoding="utf-8"?>
+<p:sld xmlns:a="http://schemas.openxmlformats.org/drawingml/2006/main" xmlns:r="http://schemas.openxmlformats.org/officeDocument/2006/relationships" xmlns:p="http://schemas.openxmlformats.org/presentationml/2006/main">
+  <p:cSld>
+    <p:spTree>
+      <p:nvGrpSpPr>
+        <p:cNvPr id="1" name=""/>
+        <p:cNvGrpSpPr/>
+        <p:nvPr/>
+      </p:nvGrpSpPr>
+      <p:grpSpPr>
+        <a:xfrm>
+          <a:off x="0" y="0"/>
+          <a:ext cx="0" cy="0"/>
+          <a:chOff x="0" y="0"/>
+          <a:chExt cx="0" cy="0"/>
+        </a:xfrm>
+      </p:grpSpPr>
+      <p:sp>
+        <p:nvSpPr>
+          <p:cNvPr id="2" name="Text Placeholder 1"/>
+          <p:cNvSpPr>
+            <a:spLocks noGrp="1"/>
+          </p:cNvSpPr>
+          <p:nvPr>
+            <p:ph type="body" sz="quarter" idx="12"/>
+          </p:nvPr>
+        </p:nvSpPr>
+        <p:spPr/>
+        <p:txBody>
+          <a:bodyPr/>
+          <a:lstStyle/>
+          <a:p>
+            <a:pPr marL="342900" indent="-342900">
+              <a:buFont typeface="Arial" charset="0"/>
+              <a:buChar char="•"/>
+            </a:pPr>
+            <a:r>
+              <a:rPr lang="en-US" b="1" dirty="0" smtClean="0">
+                <a:solidFill>
+                  <a:srgbClr val="000080"/>
+                </a:solidFill>
+              </a:rPr>
+              <a:t>File </a:t>
+            </a:r>
+            <a:r>
+              <a:rPr lang="en-US" b="1" dirty="0" smtClean="0">
+                <a:solidFill>
+                  <a:srgbClr val="000080"/>
+                </a:solidFill>
+                <a:sym typeface="Wingdings"/>
+              </a:rPr>
+              <a:t> </a:t>
+            </a:r>
+            <a:r>
+              <a:rPr lang="en-US" b="1" dirty="0" err="1" smtClean="0">
+                <a:solidFill>
+                  <a:srgbClr val="FF0000"/>
+                </a:solidFill>
+                <a:sym typeface="Wingdings"/>
+              </a:rPr>
+              <a:t>QuoteA</a:t>
+            </a:r>
+            <a:r>
+              <a:rPr lang="en-US" b="1" dirty="0" err="1" smtClean="0">
+                <a:solidFill>
+                  <a:srgbClr val="FF0000"/>
+                </a:solidFill>
+                <a:sym typeface="Wingdings"/>
+              </a:rPr>
+              <a:t>ctions.js</a:t>
+            </a:r>
+            <a:r>
+              <a:rPr lang="en-US" b="1" dirty="0" smtClean="0">
+                <a:solidFill>
+                  <a:srgbClr val="000080"/>
+                </a:solidFill>
+                <a:sym typeface="Wingdings"/>
+              </a:rPr>
+              <a:t> </a:t>
+            </a:r>
+            <a:r>
+              <a:rPr lang="en-US" dirty="0"/>
+              <a:t/>
+            </a:r>
+            <a:br>
+              <a:rPr lang="en-US" dirty="0"/>
+            </a:br>
+            <a:endParaRPr lang="en-US" dirty="0" smtClean="0"/>
+          </a:p>
+        </p:txBody>
+      </p:sp>
+      <p:sp>
+        <p:nvSpPr>
+          <p:cNvPr id="3" name="Title 2"/>
+          <p:cNvSpPr>
+            <a:spLocks noGrp="1"/>
+          </p:cNvSpPr>
+          <p:nvPr>
+            <p:ph type="title"/>
+          </p:nvPr>
+        </p:nvSpPr>
+        <p:spPr/>
+        <p:txBody>
+          <a:bodyPr/>
+          <a:lstStyle/>
+          <a:p>
+            <a:r>
+              <a:rPr lang="en-US" dirty="0" smtClean="0"/>
+              <a:t>The New Actions</a:t>
+            </a:r>
+            <a:endParaRPr lang="en-US" dirty="0"/>
+          </a:p>
+        </p:txBody>
+      </p:sp>
+      <p:pic>
+        <p:nvPicPr>
+          <p:cNvPr id="7" name="Picture 6"/>
+          <p:cNvPicPr>
+            <a:picLocks noChangeAspect="1"/>
+          </p:cNvPicPr>
+          <p:nvPr/>
+        </p:nvPicPr>
+        <p:blipFill>
+          <a:blip r:embed="rId2"/>
+          <a:stretch>
+            <a:fillRect/>
+          </a:stretch>
+        </p:blipFill>
+        <p:spPr>
+          <a:xfrm>
+            <a:off x="428202" y="1793700"/>
+            <a:ext cx="4435024" cy="4602383"/>
+          </a:xfrm>
+          <a:prstGeom prst="rect">
+            <a:avLst/>
+          </a:prstGeom>
+        </p:spPr>
+      </p:pic>
       <p:grpSp>
         <p:nvGrpSpPr>
           <p:cNvPr id="4" name="Group 3"/>
@@ -11785,7 +13032,7 @@
         </p:nvGrpSpPr>
         <p:grpSpPr>
           <a:xfrm>
-            <a:off x="3429001" y="4094892"/>
+            <a:off x="3429001" y="4331039"/>
             <a:ext cx="4797972" cy="802506"/>
             <a:chOff x="3493621" y="3178647"/>
             <a:chExt cx="4797972" cy="802506"/>
@@ -11913,8 +13160,8 @@
         </p:nvCxnSpPr>
         <p:spPr>
           <a:xfrm flipH="1">
-            <a:off x="3429001" y="4732292"/>
-            <a:ext cx="1741652" cy="207013"/>
+            <a:off x="3260595" y="5029200"/>
+            <a:ext cx="1910058" cy="499074"/>
           </a:xfrm>
           <a:prstGeom prst="straightConnector1">
             <a:avLst/>
@@ -11969,7 +13216,7 @@
 </p:sld>
 </file>
 
-<file path=ppt/slides/slide6.xml><?xml version="1.0" encoding="utf-8"?>
+<file path=ppt/slides/slide9.xml><?xml version="1.0" encoding="utf-8"?>
 <p:sld xmlns:a="http://schemas.openxmlformats.org/drawingml/2006/main" xmlns:r="http://schemas.openxmlformats.org/officeDocument/2006/relationships" xmlns:p="http://schemas.openxmlformats.org/presentationml/2006/main">
   <p:cSld>
     <p:spTree>
@@ -11986,30 +13233,6 @@
           <a:chExt cx="0" cy="0"/>
         </a:xfrm>
       </p:grpSpPr>
-      <p:pic>
-        <p:nvPicPr>
-          <p:cNvPr id="7" name="Picture 6"/>
-          <p:cNvPicPr>
-            <a:picLocks noChangeAspect="1"/>
-          </p:cNvPicPr>
-          <p:nvPr/>
-        </p:nvPicPr>
-        <p:blipFill>
-          <a:blip r:embed="rId2"/>
-          <a:stretch>
-            <a:fillRect/>
-          </a:stretch>
-        </p:blipFill>
-        <p:spPr>
-          <a:xfrm>
-            <a:off x="228600" y="2362200"/>
-            <a:ext cx="5787348" cy="1847235"/>
-          </a:xfrm>
-          <a:prstGeom prst="rect">
-            <a:avLst/>
-          </a:prstGeom>
-        </p:spPr>
-      </p:pic>
       <p:sp>
         <p:nvSpPr>
           <p:cNvPr id="2" name="Text Placeholder 1"/>
@@ -12053,7 +13276,16 @@
                 </a:solidFill>
                 <a:sym typeface="Wingdings"/>
               </a:rPr>
-              <a:t>actions.js</a:t>
+              <a:t>QuoteA</a:t>
+            </a:r>
+            <a:r>
+              <a:rPr lang="en-US" b="1" dirty="0" err="1" smtClean="0">
+                <a:solidFill>
+                  <a:srgbClr val="FF0000"/>
+                </a:solidFill>
+                <a:sym typeface="Wingdings"/>
+              </a:rPr>
+              <a:t>ctions.js</a:t>
             </a:r>
             <a:r>
               <a:rPr lang="en-US" b="1" dirty="0" smtClean="0">
@@ -12095,6 +13327,30 @@
           </a:p>
         </p:txBody>
       </p:sp>
+      <p:pic>
+        <p:nvPicPr>
+          <p:cNvPr id="8" name="Picture 7"/>
+          <p:cNvPicPr>
+            <a:picLocks noChangeAspect="1"/>
+          </p:cNvPicPr>
+          <p:nvPr/>
+        </p:nvPicPr>
+        <p:blipFill>
+          <a:blip r:embed="rId2"/>
+          <a:stretch>
+            <a:fillRect/>
+          </a:stretch>
+        </p:blipFill>
+        <p:spPr>
+          <a:xfrm>
+            <a:off x="515234" y="2055243"/>
+            <a:ext cx="5410200" cy="2540000"/>
+          </a:xfrm>
+          <a:prstGeom prst="rect">
+            <a:avLst/>
+          </a:prstGeom>
+        </p:spPr>
+      </p:pic>
       <p:grpSp>
         <p:nvGrpSpPr>
           <p:cNvPr id="4" name="Group 3"/>
@@ -12104,9 +13360,9 @@
         <p:grpSpPr>
           <a:xfrm>
             <a:off x="3505201" y="1653961"/>
-            <a:ext cx="3036363" cy="522467"/>
+            <a:ext cx="3352799" cy="522467"/>
             <a:chOff x="3638096" y="3693237"/>
-            <a:chExt cx="3036363" cy="522467"/>
+            <a:chExt cx="3352799" cy="522467"/>
           </a:xfrm>
         </p:grpSpPr>
         <p:cxnSp>
@@ -12153,8 +13409,8 @@
           </p:nvSpPr>
           <p:spPr>
             <a:xfrm>
-              <a:off x="4837418" y="3693237"/>
-              <a:ext cx="1837041" cy="276999"/>
+              <a:off x="4777147" y="3693237"/>
+              <a:ext cx="2213748" cy="276999"/>
             </a:xfrm>
             <a:prstGeom prst="rect">
               <a:avLst/>
@@ -12174,8 +13430,29 @@
                     <a:srgbClr val="FF0000"/>
                   </a:solidFill>
                 </a:rPr>
-                <a:t>Same action name</a:t>
+                <a:t>Same </a:t>
               </a:r>
+              <a:r>
+                <a:rPr lang="en-US" smtClean="0">
+                  <a:solidFill>
+                    <a:srgbClr val="FF0000"/>
+                  </a:solidFill>
+                </a:rPr>
+                <a:t>action </a:t>
+              </a:r>
+              <a:r>
+                <a:rPr lang="en-US" smtClean="0">
+                  <a:solidFill>
+                    <a:srgbClr val="FF0000"/>
+                  </a:solidFill>
+                </a:rPr>
+                <a:t>name  !!!!!</a:t>
+              </a:r>
+              <a:endParaRPr lang="en-US" dirty="0" smtClean="0">
+                <a:solidFill>
+                  <a:srgbClr val="FF0000"/>
+                </a:solidFill>
+              </a:endParaRPr>
             </a:p>
           </p:txBody>
         </p:sp>
@@ -12188,10 +13465,10 @@
         </p:nvGrpSpPr>
         <p:grpSpPr>
           <a:xfrm>
-            <a:off x="2438400" y="3886200"/>
-            <a:ext cx="6132332" cy="741074"/>
-            <a:chOff x="2337068" y="3150484"/>
-            <a:chExt cx="6132332" cy="741074"/>
+            <a:off x="3657600" y="3886200"/>
+            <a:ext cx="4913132" cy="741074"/>
+            <a:chOff x="3556268" y="3150484"/>
+            <a:chExt cx="4913132" cy="741074"/>
           </a:xfrm>
         </p:grpSpPr>
         <p:cxnSp>
@@ -12202,8 +13479,8 @@
           </p:nvCxnSpPr>
           <p:spPr>
             <a:xfrm flipH="1" flipV="1">
-              <a:off x="2337068" y="3150484"/>
-              <a:ext cx="2696660" cy="648189"/>
+              <a:off x="3556268" y="3150484"/>
+              <a:ext cx="1477460" cy="648190"/>
             </a:xfrm>
             <a:prstGeom prst="straightConnector1">
               <a:avLst/>
@@ -12289,7 +13566,7 @@
         </p:nvGrpSpPr>
         <p:grpSpPr>
           <a:xfrm>
-            <a:off x="4499648" y="2805351"/>
+            <a:off x="4499648" y="2743200"/>
             <a:ext cx="4182159" cy="276999"/>
             <a:chOff x="4358448" y="3614559"/>
             <a:chExt cx="4182159" cy="276999"/>
@@ -12386,981 +13663,6 @@
     <p:extLst>
       <p:ext uri="{BB962C8B-B14F-4D97-AF65-F5344CB8AC3E}">
         <p14:creationId xmlns:p14="http://schemas.microsoft.com/office/powerpoint/2010/main" val="2058167334"/>
-      </p:ext>
-    </p:extLst>
-  </p:cSld>
-  <p:clrMapOvr>
-    <a:masterClrMapping/>
-  </p:clrMapOvr>
-  <mc:AlternateContent xmlns:mc="http://schemas.openxmlformats.org/markup-compatibility/2006" xmlns:p14="http://schemas.microsoft.com/office/powerpoint/2010/main">
-    <mc:Choice Requires="p14">
-      <p:transition p14:dur="0"/>
-    </mc:Choice>
-    <mc:Fallback xmlns="">
-      <p:transition/>
-    </mc:Fallback>
-  </mc:AlternateContent>
-  <p:timing>
-    <p:tnLst>
-      <p:par>
-        <p:cTn id="1" dur="indefinite" restart="never" nodeType="tmRoot"/>
-      </p:par>
-    </p:tnLst>
-  </p:timing>
-</p:sld>
-</file>
-
-<file path=ppt/slides/slide7.xml><?xml version="1.0" encoding="utf-8"?>
-<p:sld xmlns:a="http://schemas.openxmlformats.org/drawingml/2006/main" xmlns:r="http://schemas.openxmlformats.org/officeDocument/2006/relationships" xmlns:p="http://schemas.openxmlformats.org/presentationml/2006/main">
-  <p:cSld>
-    <p:spTree>
-      <p:nvGrpSpPr>
-        <p:cNvPr id="1" name=""/>
-        <p:cNvGrpSpPr/>
-        <p:nvPr/>
-      </p:nvGrpSpPr>
-      <p:grpSpPr>
-        <a:xfrm>
-          <a:off x="0" y="0"/>
-          <a:ext cx="0" cy="0"/>
-          <a:chOff x="0" y="0"/>
-          <a:chExt cx="0" cy="0"/>
-        </a:xfrm>
-      </p:grpSpPr>
-      <p:sp>
-        <p:nvSpPr>
-          <p:cNvPr id="2" name="Text Placeholder 1"/>
-          <p:cNvSpPr>
-            <a:spLocks noGrp="1"/>
-          </p:cNvSpPr>
-          <p:nvPr>
-            <p:ph type="body" sz="quarter" idx="12"/>
-          </p:nvPr>
-        </p:nvSpPr>
-        <p:spPr/>
-        <p:txBody>
-          <a:bodyPr/>
-          <a:lstStyle/>
-          <a:p>
-            <a:pPr marL="342900" indent="-342900">
-              <a:buFont typeface="Arial" charset="0"/>
-              <a:buChar char="•"/>
-            </a:pPr>
-            <a:r>
-              <a:rPr lang="en-US" dirty="0" smtClean="0"/>
-              <a:t>File </a:t>
-            </a:r>
-            <a:r>
-              <a:rPr lang="en-US" dirty="0" smtClean="0">
-                <a:sym typeface="Wingdings"/>
-              </a:rPr>
-              <a:t> </a:t>
-            </a:r>
-            <a:r>
-              <a:rPr lang="en-US" dirty="0" err="1" smtClean="0">
-                <a:solidFill>
-                  <a:srgbClr val="FF0000"/>
-                </a:solidFill>
-                <a:sym typeface="Wingdings"/>
-              </a:rPr>
-              <a:t>reducer.js</a:t>
-            </a:r>
-            <a:r>
-              <a:rPr lang="en-US" dirty="0" smtClean="0">
-                <a:sym typeface="Wingdings"/>
-              </a:rPr>
-              <a:t> </a:t>
-            </a:r>
-            <a:endParaRPr lang="en-US" dirty="0" smtClean="0"/>
-          </a:p>
-          <a:p>
-            <a:pPr marL="1203325" lvl="3" indent="-342900">
-              <a:buFont typeface="Arial" charset="0"/>
-              <a:buChar char="•"/>
-            </a:pPr>
-            <a:r>
-              <a:rPr lang="en-US" sz="1600" b="1" dirty="0">
-                <a:solidFill>
-                  <a:srgbClr val="000080"/>
-                </a:solidFill>
-              </a:rPr>
-              <a:t>function </a:t>
-            </a:r>
-            <a:r>
-              <a:rPr lang="en-US" sz="1600" i="1" dirty="0" err="1"/>
-              <a:t>nameReducer</a:t>
-            </a:r>
-            <a:r>
-              <a:rPr lang="en-US" sz="1600" dirty="0" smtClean="0"/>
-              <a:t>( state</a:t>
-            </a:r>
-            <a:r>
-              <a:rPr lang="en-US" sz="1600" dirty="0"/>
-              <a:t>, </a:t>
-            </a:r>
-            <a:r>
-              <a:rPr lang="en-US" sz="1600" dirty="0" smtClean="0"/>
-              <a:t>action ) </a:t>
-            </a:r>
-            <a:r>
-              <a:rPr lang="en-US" sz="1600" dirty="0"/>
-              <a:t>{</a:t>
-            </a:r>
-            <a:br>
-              <a:rPr lang="en-US" sz="1600" dirty="0"/>
-            </a:br>
-            <a:r>
-              <a:rPr lang="en-US" sz="1600" dirty="0"/>
-              <a:t>   state = state || </a:t>
-            </a:r>
-            <a:r>
-              <a:rPr lang="en-US" sz="1600" b="1" i="1" dirty="0" err="1">
-                <a:solidFill>
-                  <a:srgbClr val="660E7A"/>
-                </a:solidFill>
-              </a:rPr>
-              <a:t>initialState</a:t>
-            </a:r>
-            <a:r>
-              <a:rPr lang="en-US" sz="1600" dirty="0"/>
-              <a:t>;</a:t>
-            </a:r>
-            <a:br>
-              <a:rPr lang="en-US" sz="1600" dirty="0"/>
-            </a:br>
-            <a:r>
-              <a:rPr lang="en-US" sz="1600" dirty="0"/>
-              <a:t>   </a:t>
-            </a:r>
-            <a:r>
-              <a:rPr lang="en-US" sz="1600" b="1" dirty="0">
-                <a:solidFill>
-                  <a:srgbClr val="000080"/>
-                </a:solidFill>
-              </a:rPr>
-              <a:t>switch </a:t>
-            </a:r>
-            <a:r>
-              <a:rPr lang="en-US" sz="1600" dirty="0"/>
-              <a:t>(</a:t>
-            </a:r>
-            <a:r>
-              <a:rPr lang="en-US" sz="1600" dirty="0" err="1"/>
-              <a:t>action.</a:t>
-            </a:r>
-            <a:r>
-              <a:rPr lang="en-US" sz="1600" b="1" dirty="0" err="1">
-                <a:solidFill>
-                  <a:srgbClr val="660E7A"/>
-                </a:solidFill>
-              </a:rPr>
-              <a:t>type</a:t>
-            </a:r>
-            <a:r>
-              <a:rPr lang="en-US" sz="1600" dirty="0"/>
-              <a:t>) </a:t>
-            </a:r>
-            <a:r>
-              <a:rPr lang="en-US" sz="1600" dirty="0" smtClean="0"/>
-              <a:t>{</a:t>
-            </a:r>
-            <a:r>
-              <a:rPr lang="en-US" sz="1600" dirty="0"/>
-              <a:t/>
-            </a:r>
-            <a:br>
-              <a:rPr lang="en-US" sz="1600" dirty="0"/>
-            </a:br>
-            <a:r>
-              <a:rPr lang="en-US" sz="1600" dirty="0"/>
-              <a:t>      </a:t>
-            </a:r>
-            <a:r>
-              <a:rPr lang="en-US" sz="1600" b="1" dirty="0">
-                <a:solidFill>
-                  <a:srgbClr val="000080"/>
-                </a:solidFill>
-              </a:rPr>
-              <a:t>case </a:t>
-            </a:r>
-            <a:r>
-              <a:rPr lang="en-US" sz="1600" dirty="0" err="1" smtClean="0"/>
-              <a:t>constants.</a:t>
-            </a:r>
-            <a:r>
-              <a:rPr lang="en-US" sz="1600" b="1" i="1" dirty="0" err="1" smtClean="0">
-                <a:solidFill>
-                  <a:srgbClr val="660E7A"/>
-                </a:solidFill>
-              </a:rPr>
-              <a:t>SAVE_QUOTE</a:t>
-            </a:r>
-            <a:r>
-              <a:rPr lang="en-US" sz="1600" dirty="0" smtClean="0"/>
-              <a:t>:</a:t>
-            </a:r>
-            <a:r>
-              <a:rPr lang="en-US" sz="1600" dirty="0"/>
-              <a:t/>
-            </a:r>
-            <a:br>
-              <a:rPr lang="en-US" sz="1600" dirty="0"/>
-            </a:br>
-            <a:r>
-              <a:rPr lang="en-US" sz="1600" dirty="0"/>
-              <a:t>      </a:t>
-            </a:r>
-            <a:r>
-              <a:rPr lang="en-US" sz="1600" b="1" dirty="0">
-                <a:solidFill>
-                  <a:srgbClr val="000080"/>
-                </a:solidFill>
-              </a:rPr>
-              <a:t>case </a:t>
-            </a:r>
-            <a:r>
-              <a:rPr lang="en-US" sz="1600" dirty="0" err="1" smtClean="0"/>
-              <a:t>constants.</a:t>
-            </a:r>
-            <a:r>
-              <a:rPr lang="en-US" sz="1600" b="1" i="1" dirty="0" err="1" smtClean="0">
-                <a:solidFill>
-                  <a:srgbClr val="660E7A"/>
-                </a:solidFill>
-              </a:rPr>
-              <a:t>RECEIVE_QUOTE</a:t>
-            </a:r>
-            <a:r>
-              <a:rPr lang="en-US" sz="1600" dirty="0" smtClean="0"/>
-              <a:t>:</a:t>
-            </a:r>
-            <a:r>
-              <a:rPr lang="en-US" sz="1600" dirty="0"/>
-              <a:t/>
-            </a:r>
-            <a:br>
-              <a:rPr lang="en-US" sz="1600" dirty="0"/>
-            </a:br>
-            <a:r>
-              <a:rPr lang="en-US" sz="1600" dirty="0"/>
-              <a:t>         </a:t>
-            </a:r>
-            <a:r>
-              <a:rPr lang="en-US" sz="1600" b="1" dirty="0">
-                <a:solidFill>
-                  <a:srgbClr val="000080"/>
-                </a:solidFill>
-              </a:rPr>
-              <a:t>return </a:t>
-            </a:r>
-            <a:r>
-              <a:rPr lang="en-US" sz="1600" dirty="0"/>
-              <a:t>{</a:t>
-            </a:r>
-            <a:br>
-              <a:rPr lang="en-US" sz="1600" dirty="0"/>
-            </a:br>
-            <a:r>
-              <a:rPr lang="en-US" sz="1600" dirty="0"/>
-              <a:t>            ...state,</a:t>
-            </a:r>
-            <a:br>
-              <a:rPr lang="en-US" sz="1600" dirty="0"/>
-            </a:br>
-            <a:r>
-              <a:rPr lang="en-US" sz="1600" dirty="0"/>
-              <a:t>            </a:t>
-            </a:r>
-            <a:r>
-              <a:rPr lang="en-US" sz="1600" b="1" dirty="0">
-                <a:solidFill>
-                  <a:srgbClr val="660E7A"/>
-                </a:solidFill>
-              </a:rPr>
-              <a:t>name</a:t>
-            </a:r>
-            <a:r>
-              <a:rPr lang="en-US" sz="1600" dirty="0"/>
-              <a:t>: </a:t>
-            </a:r>
-            <a:r>
-              <a:rPr lang="en-US" sz="1600" dirty="0" err="1"/>
-              <a:t>action.</a:t>
-            </a:r>
-            <a:r>
-              <a:rPr lang="en-US" sz="1600" b="1" dirty="0" err="1">
-                <a:solidFill>
-                  <a:srgbClr val="660E7A"/>
-                </a:solidFill>
-              </a:rPr>
-              <a:t>payload</a:t>
-            </a:r>
-            <a:r>
-              <a:rPr lang="en-US" sz="1600" dirty="0" err="1"/>
-              <a:t>.</a:t>
-            </a:r>
-            <a:r>
-              <a:rPr lang="en-US" sz="1600" b="1" dirty="0" err="1">
-                <a:solidFill>
-                  <a:srgbClr val="660E7A"/>
-                </a:solidFill>
-              </a:rPr>
-              <a:t>name</a:t>
-            </a:r>
-            <a:r>
-              <a:rPr lang="en-US" sz="1600" dirty="0"/>
-              <a:t>,</a:t>
-            </a:r>
-            <a:br>
-              <a:rPr lang="en-US" sz="1600" dirty="0"/>
-            </a:br>
-            <a:r>
-              <a:rPr lang="en-US" sz="1600" dirty="0"/>
-              <a:t>            </a:t>
-            </a:r>
-            <a:r>
-              <a:rPr lang="en-US" sz="1600" b="1" dirty="0">
-                <a:solidFill>
-                  <a:srgbClr val="660E7A"/>
-                </a:solidFill>
-              </a:rPr>
-              <a:t>quote</a:t>
-            </a:r>
-            <a:r>
-              <a:rPr lang="en-US" sz="1600" dirty="0"/>
-              <a:t>: </a:t>
-            </a:r>
-            <a:r>
-              <a:rPr lang="en-US" sz="1600" dirty="0" err="1"/>
-              <a:t>action.</a:t>
-            </a:r>
-            <a:r>
-              <a:rPr lang="en-US" sz="1600" b="1" dirty="0" err="1">
-                <a:solidFill>
-                  <a:srgbClr val="660E7A"/>
-                </a:solidFill>
-              </a:rPr>
-              <a:t>payload</a:t>
-            </a:r>
-            <a:r>
-              <a:rPr lang="en-US" sz="1600" dirty="0" err="1"/>
-              <a:t>.</a:t>
-            </a:r>
-            <a:r>
-              <a:rPr lang="en-US" sz="1600" b="1" dirty="0" err="1">
-                <a:solidFill>
-                  <a:srgbClr val="660E7A"/>
-                </a:solidFill>
-              </a:rPr>
-              <a:t>quote</a:t>
-            </a:r>
-            <a:r>
-              <a:rPr lang="en-US" sz="1600" dirty="0"/>
-              <a:t>,</a:t>
-            </a:r>
-            <a:br>
-              <a:rPr lang="en-US" sz="1600" dirty="0"/>
-            </a:br>
-            <a:r>
-              <a:rPr lang="en-US" sz="1600" dirty="0"/>
-              <a:t>            </a:t>
-            </a:r>
-            <a:r>
-              <a:rPr lang="en-US" sz="1600" b="1" dirty="0" err="1">
-                <a:solidFill>
-                  <a:srgbClr val="660E7A"/>
-                </a:solidFill>
-              </a:rPr>
-              <a:t>isDelayed</a:t>
-            </a:r>
-            <a:r>
-              <a:rPr lang="en-US" sz="1600" dirty="0"/>
-              <a:t>: </a:t>
-            </a:r>
-            <a:r>
-              <a:rPr lang="en-US" sz="1600" b="1" dirty="0">
-                <a:solidFill>
-                  <a:srgbClr val="000080"/>
-                </a:solidFill>
-              </a:rPr>
-              <a:t>false</a:t>
-            </a:r>
-            <a:br>
-              <a:rPr lang="en-US" sz="1600" b="1" dirty="0">
-                <a:solidFill>
-                  <a:srgbClr val="000080"/>
-                </a:solidFill>
-              </a:rPr>
-            </a:br>
-            <a:r>
-              <a:rPr lang="en-US" sz="1600" b="1" dirty="0">
-                <a:solidFill>
-                  <a:srgbClr val="000080"/>
-                </a:solidFill>
-              </a:rPr>
-              <a:t>         </a:t>
-            </a:r>
-            <a:r>
-              <a:rPr lang="en-US" sz="1600" dirty="0" smtClean="0"/>
-              <a:t>};</a:t>
-            </a:r>
-            <a:r>
-              <a:rPr lang="en-US" sz="1600" dirty="0"/>
-              <a:t/>
-            </a:r>
-            <a:br>
-              <a:rPr lang="en-US" sz="1600" dirty="0"/>
-            </a:br>
-            <a:r>
-              <a:rPr lang="en-US" sz="1600" dirty="0"/>
-              <a:t>      </a:t>
-            </a:r>
-            <a:r>
-              <a:rPr lang="en-US" sz="1600" b="1" dirty="0">
-                <a:solidFill>
-                  <a:srgbClr val="000080"/>
-                </a:solidFill>
-              </a:rPr>
-              <a:t>case </a:t>
-            </a:r>
-            <a:r>
-              <a:rPr lang="en-US" sz="1600" dirty="0" err="1" smtClean="0"/>
-              <a:t>constants.</a:t>
-            </a:r>
-            <a:r>
-              <a:rPr lang="en-US" sz="1600" b="1" i="1" dirty="0" err="1" smtClean="0">
-                <a:solidFill>
-                  <a:srgbClr val="660E7A"/>
-                </a:solidFill>
-              </a:rPr>
-              <a:t>REQUEST_QUOTE</a:t>
-            </a:r>
-            <a:r>
-              <a:rPr lang="en-US" sz="1600" dirty="0" smtClean="0"/>
-              <a:t>:</a:t>
-            </a:r>
-            <a:r>
-              <a:rPr lang="en-US" sz="1600" dirty="0"/>
-              <a:t/>
-            </a:r>
-            <a:br>
-              <a:rPr lang="en-US" sz="1600" dirty="0"/>
-            </a:br>
-            <a:r>
-              <a:rPr lang="en-US" sz="1600" dirty="0"/>
-              <a:t>         </a:t>
-            </a:r>
-            <a:r>
-              <a:rPr lang="en-US" sz="1600" b="1" dirty="0">
-                <a:solidFill>
-                  <a:srgbClr val="000080"/>
-                </a:solidFill>
-              </a:rPr>
-              <a:t>return </a:t>
-            </a:r>
-            <a:r>
-              <a:rPr lang="en-US" sz="1600" dirty="0"/>
-              <a:t>{</a:t>
-            </a:r>
-            <a:br>
-              <a:rPr lang="en-US" sz="1600" dirty="0"/>
-            </a:br>
-            <a:r>
-              <a:rPr lang="en-US" sz="1600" dirty="0"/>
-              <a:t>            ...state,</a:t>
-            </a:r>
-            <a:br>
-              <a:rPr lang="en-US" sz="1600" dirty="0"/>
-            </a:br>
-            <a:r>
-              <a:rPr lang="en-US" sz="1600" dirty="0"/>
-              <a:t>            </a:t>
-            </a:r>
-            <a:r>
-              <a:rPr lang="en-US" sz="1600" b="1" dirty="0" err="1">
-                <a:solidFill>
-                  <a:srgbClr val="660E7A"/>
-                </a:solidFill>
-              </a:rPr>
-              <a:t>isDelayed</a:t>
-            </a:r>
-            <a:r>
-              <a:rPr lang="en-US" sz="1600" dirty="0"/>
-              <a:t>: </a:t>
-            </a:r>
-            <a:r>
-              <a:rPr lang="en-US" sz="1600" dirty="0" err="1"/>
-              <a:t>action.</a:t>
-            </a:r>
-            <a:r>
-              <a:rPr lang="en-US" sz="1600" b="1" dirty="0" err="1">
-                <a:solidFill>
-                  <a:srgbClr val="660E7A"/>
-                </a:solidFill>
-              </a:rPr>
-              <a:t>payload</a:t>
-            </a:r>
-            <a:r>
-              <a:rPr lang="en-US" sz="1600" dirty="0" err="1"/>
-              <a:t>.</a:t>
-            </a:r>
-            <a:r>
-              <a:rPr lang="en-US" sz="1600" b="1" dirty="0" err="1">
-                <a:solidFill>
-                  <a:srgbClr val="660E7A"/>
-                </a:solidFill>
-              </a:rPr>
-              <a:t>isDelayed</a:t>
-            </a:r>
-            <a:r>
-              <a:rPr lang="en-US" sz="1600" b="1" dirty="0">
-                <a:solidFill>
-                  <a:srgbClr val="660E7A"/>
-                </a:solidFill>
-              </a:rPr>
-              <a:t/>
-            </a:r>
-            <a:br>
-              <a:rPr lang="en-US" sz="1600" b="1" dirty="0">
-                <a:solidFill>
-                  <a:srgbClr val="660E7A"/>
-                </a:solidFill>
-              </a:rPr>
-            </a:br>
-            <a:r>
-              <a:rPr lang="en-US" sz="1600" b="1" dirty="0">
-                <a:solidFill>
-                  <a:srgbClr val="660E7A"/>
-                </a:solidFill>
-              </a:rPr>
-              <a:t>         </a:t>
-            </a:r>
-            <a:r>
-              <a:rPr lang="en-US" sz="1600" dirty="0" smtClean="0"/>
-              <a:t>};</a:t>
-            </a:r>
-            <a:r>
-              <a:rPr lang="en-US" sz="1600" dirty="0"/>
-              <a:t/>
-            </a:r>
-            <a:br>
-              <a:rPr lang="en-US" sz="1600" dirty="0"/>
-            </a:br>
-            <a:r>
-              <a:rPr lang="en-US" sz="1600" dirty="0"/>
-              <a:t>      </a:t>
-            </a:r>
-            <a:r>
-              <a:rPr lang="en-US" sz="1600" b="1" dirty="0">
-                <a:solidFill>
-                  <a:srgbClr val="000080"/>
-                </a:solidFill>
-              </a:rPr>
-              <a:t>default</a:t>
-            </a:r>
-            <a:r>
-              <a:rPr lang="en-US" sz="1600" dirty="0"/>
-              <a:t>:</a:t>
-            </a:r>
-            <a:br>
-              <a:rPr lang="en-US" sz="1600" dirty="0"/>
-            </a:br>
-            <a:r>
-              <a:rPr lang="en-US" sz="1600" dirty="0"/>
-              <a:t>         </a:t>
-            </a:r>
-            <a:r>
-              <a:rPr lang="en-US" sz="1600" b="1" dirty="0">
-                <a:solidFill>
-                  <a:srgbClr val="000080"/>
-                </a:solidFill>
-              </a:rPr>
-              <a:t>return </a:t>
-            </a:r>
-            <a:r>
-              <a:rPr lang="en-US" sz="1600" dirty="0"/>
-              <a:t>state</a:t>
-            </a:r>
-            <a:br>
-              <a:rPr lang="en-US" sz="1600" dirty="0"/>
-            </a:br>
-            <a:r>
-              <a:rPr lang="en-US" sz="1600" dirty="0"/>
-              <a:t>   }</a:t>
-            </a:r>
-            <a:br>
-              <a:rPr lang="en-US" sz="1600" dirty="0"/>
-            </a:br>
-            <a:r>
-              <a:rPr lang="en-US" sz="1600" dirty="0"/>
-              <a:t>}</a:t>
-            </a:r>
-            <a:br>
-              <a:rPr lang="en-US" sz="1600" dirty="0"/>
-            </a:br>
-            <a:endParaRPr lang="en-US" sz="1600" dirty="0" smtClean="0"/>
-          </a:p>
-        </p:txBody>
-      </p:sp>
-      <p:sp>
-        <p:nvSpPr>
-          <p:cNvPr id="3" name="Title 2"/>
-          <p:cNvSpPr>
-            <a:spLocks noGrp="1"/>
-          </p:cNvSpPr>
-          <p:nvPr>
-            <p:ph type="title"/>
-          </p:nvPr>
-        </p:nvSpPr>
-        <p:spPr/>
-        <p:txBody>
-          <a:bodyPr/>
-          <a:lstStyle/>
-          <a:p>
-            <a:r>
-              <a:rPr lang="en-US" dirty="0" smtClean="0"/>
-              <a:t>The New Reducer</a:t>
-            </a:r>
-            <a:endParaRPr lang="en-US" dirty="0"/>
-          </a:p>
-        </p:txBody>
-      </p:sp>
-    </p:spTree>
-    <p:extLst>
-      <p:ext uri="{BB962C8B-B14F-4D97-AF65-F5344CB8AC3E}">
-        <p14:creationId xmlns:p14="http://schemas.microsoft.com/office/powerpoint/2010/main" val="465890312"/>
-      </p:ext>
-    </p:extLst>
-  </p:cSld>
-  <p:clrMapOvr>
-    <a:masterClrMapping/>
-  </p:clrMapOvr>
-  <mc:AlternateContent xmlns:mc="http://schemas.openxmlformats.org/markup-compatibility/2006" xmlns:p14="http://schemas.microsoft.com/office/powerpoint/2010/main">
-    <mc:Choice Requires="p14">
-      <p:transition p14:dur="0"/>
-    </mc:Choice>
-    <mc:Fallback xmlns="">
-      <p:transition/>
-    </mc:Fallback>
-  </mc:AlternateContent>
-  <p:timing>
-    <p:tnLst>
-      <p:par>
-        <p:cTn id="1" dur="indefinite" restart="never" nodeType="tmRoot"/>
-      </p:par>
-    </p:tnLst>
-  </p:timing>
-</p:sld>
-</file>
-
-<file path=ppt/slides/slide8.xml><?xml version="1.0" encoding="utf-8"?>
-<p:sld xmlns:a="http://schemas.openxmlformats.org/drawingml/2006/main" xmlns:r="http://schemas.openxmlformats.org/officeDocument/2006/relationships" xmlns:p="http://schemas.openxmlformats.org/presentationml/2006/main">
-  <p:cSld>
-    <p:spTree>
-      <p:nvGrpSpPr>
-        <p:cNvPr id="1" name=""/>
-        <p:cNvGrpSpPr/>
-        <p:nvPr/>
-      </p:nvGrpSpPr>
-      <p:grpSpPr>
-        <a:xfrm>
-          <a:off x="0" y="0"/>
-          <a:ext cx="0" cy="0"/>
-          <a:chOff x="0" y="0"/>
-          <a:chExt cx="0" cy="0"/>
-        </a:xfrm>
-      </p:grpSpPr>
-      <p:sp>
-        <p:nvSpPr>
-          <p:cNvPr id="2" name="Text Placeholder 1"/>
-          <p:cNvSpPr>
-            <a:spLocks noGrp="1"/>
-          </p:cNvSpPr>
-          <p:nvPr>
-            <p:ph type="body" sz="quarter" idx="12"/>
-          </p:nvPr>
-        </p:nvSpPr>
-        <p:spPr/>
-        <p:txBody>
-          <a:bodyPr/>
-          <a:lstStyle/>
-          <a:p>
-            <a:pPr marL="342900" indent="-342900">
-              <a:buFont typeface="Arial" charset="0"/>
-              <a:buChar char="•"/>
-            </a:pPr>
-            <a:r>
-              <a:rPr lang="en-US" dirty="0" smtClean="0"/>
-              <a:t>Configure the store to add the dispatch() function </a:t>
-            </a:r>
-            <a:r>
-              <a:rPr lang="en-US" dirty="0" smtClean="0"/>
-              <a:t>call</a:t>
-            </a:r>
-            <a:endParaRPr lang="en-US" dirty="0" smtClean="0"/>
-          </a:p>
-        </p:txBody>
-      </p:sp>
-      <p:sp>
-        <p:nvSpPr>
-          <p:cNvPr id="3" name="Title 2"/>
-          <p:cNvSpPr>
-            <a:spLocks noGrp="1"/>
-          </p:cNvSpPr>
-          <p:nvPr>
-            <p:ph type="title"/>
-          </p:nvPr>
-        </p:nvSpPr>
-        <p:spPr/>
-        <p:txBody>
-          <a:bodyPr/>
-          <a:lstStyle/>
-          <a:p>
-            <a:r>
-              <a:rPr lang="en-US" dirty="0" smtClean="0"/>
-              <a:t>Configure the </a:t>
-            </a:r>
-            <a:r>
-              <a:rPr lang="en-US" dirty="0" smtClean="0"/>
-              <a:t>store </a:t>
-            </a:r>
-            <a:r>
-              <a:rPr lang="mr-IN" dirty="0" smtClean="0"/>
-              <a:t>–</a:t>
-            </a:r>
-            <a:r>
-              <a:rPr lang="en-US" dirty="0" smtClean="0"/>
-              <a:t> </a:t>
-            </a:r>
-            <a:r>
-              <a:rPr lang="en-US" dirty="0" err="1" smtClean="0"/>
-              <a:t>store.js</a:t>
-            </a:r>
-            <a:endParaRPr lang="en-US" dirty="0"/>
-          </a:p>
-        </p:txBody>
-      </p:sp>
-      <p:pic>
-        <p:nvPicPr>
-          <p:cNvPr id="4" name="Picture 3"/>
-          <p:cNvPicPr>
-            <a:picLocks noChangeAspect="1"/>
-          </p:cNvPicPr>
-          <p:nvPr/>
-        </p:nvPicPr>
-        <p:blipFill>
-          <a:blip r:embed="rId2"/>
-          <a:stretch>
-            <a:fillRect/>
-          </a:stretch>
-        </p:blipFill>
-        <p:spPr>
-          <a:xfrm>
-            <a:off x="468471" y="1828800"/>
-            <a:ext cx="7696200" cy="4772837"/>
-          </a:xfrm>
-          <a:prstGeom prst="rect">
-            <a:avLst/>
-          </a:prstGeom>
-        </p:spPr>
-      </p:pic>
-    </p:spTree>
-    <p:extLst>
-      <p:ext uri="{BB962C8B-B14F-4D97-AF65-F5344CB8AC3E}">
-        <p14:creationId xmlns:p14="http://schemas.microsoft.com/office/powerpoint/2010/main" val="493096822"/>
-      </p:ext>
-    </p:extLst>
-  </p:cSld>
-  <p:clrMapOvr>
-    <a:masterClrMapping/>
-  </p:clrMapOvr>
-  <mc:AlternateContent xmlns:mc="http://schemas.openxmlformats.org/markup-compatibility/2006" xmlns:p14="http://schemas.microsoft.com/office/powerpoint/2010/main">
-    <mc:Choice Requires="p14">
-      <p:transition p14:dur="0"/>
-    </mc:Choice>
-    <mc:Fallback xmlns="">
-      <p:transition/>
-    </mc:Fallback>
-  </mc:AlternateContent>
-  <p:timing>
-    <p:tnLst>
-      <p:par>
-        <p:cTn id="1" dur="indefinite" restart="never" nodeType="tmRoot"/>
-      </p:par>
-    </p:tnLst>
-  </p:timing>
-</p:sld>
-</file>
-
-<file path=ppt/slides/slide9.xml><?xml version="1.0" encoding="utf-8"?>
-<p:sld xmlns:a="http://schemas.openxmlformats.org/drawingml/2006/main" xmlns:r="http://schemas.openxmlformats.org/officeDocument/2006/relationships" xmlns:p="http://schemas.openxmlformats.org/presentationml/2006/main">
-  <p:cSld>
-    <p:spTree>
-      <p:nvGrpSpPr>
-        <p:cNvPr id="1" name=""/>
-        <p:cNvGrpSpPr/>
-        <p:nvPr/>
-      </p:nvGrpSpPr>
-      <p:grpSpPr>
-        <a:xfrm>
-          <a:off x="0" y="0"/>
-          <a:ext cx="0" cy="0"/>
-          <a:chOff x="0" y="0"/>
-          <a:chExt cx="0" cy="0"/>
-        </a:xfrm>
-      </p:grpSpPr>
-      <p:sp>
-        <p:nvSpPr>
-          <p:cNvPr id="2" name="Text Placeholder 1"/>
-          <p:cNvSpPr>
-            <a:spLocks noGrp="1"/>
-          </p:cNvSpPr>
-          <p:nvPr>
-            <p:ph type="body" sz="quarter" idx="12"/>
-          </p:nvPr>
-        </p:nvSpPr>
-        <p:spPr/>
-        <p:txBody>
-          <a:bodyPr/>
-          <a:lstStyle/>
-          <a:p>
-            <a:pPr marL="342900" indent="-342900">
-              <a:buFont typeface="Arial" charset="0"/>
-              <a:buChar char="•"/>
-            </a:pPr>
-            <a:r>
-              <a:rPr lang="en-US" dirty="0" err="1" smtClean="0"/>
-              <a:t>Async</a:t>
-            </a:r>
-            <a:r>
-              <a:rPr lang="en-US" dirty="0" smtClean="0"/>
-              <a:t> requires that the Action</a:t>
-            </a:r>
-          </a:p>
-          <a:p>
-            <a:pPr marL="631825" lvl="1" indent="-342900">
-              <a:buFont typeface="Arial" charset="0"/>
-              <a:buChar char="•"/>
-            </a:pPr>
-            <a:r>
-              <a:rPr lang="en-US" dirty="0" smtClean="0"/>
-              <a:t>Dispatches multiple Action Commands</a:t>
-            </a:r>
-          </a:p>
-          <a:p>
-            <a:pPr marL="631825" lvl="1" indent="-342900">
-              <a:buFont typeface="Arial" charset="0"/>
-              <a:buChar char="•"/>
-            </a:pPr>
-            <a:r>
-              <a:rPr lang="en-US" dirty="0" smtClean="0"/>
-              <a:t>The BEFORE action </a:t>
-            </a:r>
-            <a:r>
-              <a:rPr lang="mr-IN" dirty="0" smtClean="0"/>
-              <a:t>–</a:t>
-            </a:r>
-            <a:r>
-              <a:rPr lang="en-US" dirty="0" smtClean="0"/>
-              <a:t> spinners</a:t>
-            </a:r>
-          </a:p>
-          <a:p>
-            <a:pPr marL="631825" lvl="1" indent="-342900">
-              <a:buFont typeface="Arial" charset="0"/>
-              <a:buChar char="•"/>
-            </a:pPr>
-            <a:r>
-              <a:rPr lang="en-US" dirty="0" smtClean="0"/>
-              <a:t>The ASYNC call</a:t>
-            </a:r>
-          </a:p>
-          <a:p>
-            <a:pPr marL="631825" lvl="1" indent="-342900">
-              <a:buFont typeface="Arial" charset="0"/>
-              <a:buChar char="•"/>
-            </a:pPr>
-            <a:r>
-              <a:rPr lang="en-US" dirty="0" smtClean="0"/>
-              <a:t>The AFTER action</a:t>
-            </a:r>
-          </a:p>
-          <a:p>
-            <a:pPr marL="917575" lvl="2" indent="-342900">
-              <a:buFont typeface="Arial" charset="0"/>
-              <a:buChar char="•"/>
-            </a:pPr>
-            <a:r>
-              <a:rPr lang="en-US" dirty="0" smtClean="0"/>
-              <a:t>Save the data</a:t>
-            </a:r>
-          </a:p>
-          <a:p>
-            <a:pPr marL="917575" lvl="2" indent="-342900">
-              <a:buFont typeface="Arial" charset="0"/>
-              <a:buChar char="•"/>
-            </a:pPr>
-            <a:r>
-              <a:rPr lang="en-US" dirty="0" smtClean="0"/>
-              <a:t>Set the state for</a:t>
-            </a:r>
-          </a:p>
-          <a:p>
-            <a:pPr marL="1203325" lvl="3" indent="-342900">
-              <a:buFont typeface="Arial" charset="0"/>
-              <a:buChar char="•"/>
-            </a:pPr>
-            <a:r>
-              <a:rPr lang="en-US" dirty="0" smtClean="0"/>
-              <a:t>Spinners</a:t>
-            </a:r>
-          </a:p>
-          <a:p>
-            <a:pPr marL="1203325" lvl="3" indent="-342900">
-              <a:buFont typeface="Arial" charset="0"/>
-              <a:buChar char="•"/>
-            </a:pPr>
-            <a:r>
-              <a:rPr lang="en-US" dirty="0" smtClean="0"/>
-              <a:t>Errors</a:t>
-            </a:r>
-          </a:p>
-          <a:p>
-            <a:pPr marL="342900" indent="-342900">
-              <a:buFont typeface="Arial" charset="0"/>
-              <a:buChar char="•"/>
-            </a:pPr>
-            <a:endParaRPr lang="en-US" dirty="0" smtClean="0"/>
-          </a:p>
-        </p:txBody>
-      </p:sp>
-      <p:sp>
-        <p:nvSpPr>
-          <p:cNvPr id="3" name="Title 2"/>
-          <p:cNvSpPr>
-            <a:spLocks noGrp="1"/>
-          </p:cNvSpPr>
-          <p:nvPr>
-            <p:ph type="title"/>
-          </p:nvPr>
-        </p:nvSpPr>
-        <p:spPr/>
-        <p:txBody>
-          <a:bodyPr/>
-          <a:lstStyle/>
-          <a:p>
-            <a:r>
-              <a:rPr lang="en-US" dirty="0" smtClean="0"/>
-              <a:t>Summary</a:t>
-            </a:r>
-            <a:endParaRPr lang="en-US" dirty="0"/>
-          </a:p>
-        </p:txBody>
-      </p:sp>
-    </p:spTree>
-    <p:extLst>
-      <p:ext uri="{BB962C8B-B14F-4D97-AF65-F5344CB8AC3E}">
-        <p14:creationId xmlns:p14="http://schemas.microsoft.com/office/powerpoint/2010/main" val="1482048915"/>
       </p:ext>
     </p:extLst>
   </p:cSld>

</xml_diff>